<commit_message>
Präsentation um Grafikteil erweitert.
</commit_message>
<xml_diff>
--- a/Documents/Design/Design_Präsentation_v1.pptx
+++ b/Documents/Design/Design_Präsentation_v1.pptx
@@ -5,10 +5,10 @@
     <p:sldMasterId id="2147483696" r:id="rId1"/>
   </p:sldMasterIdLst>
   <p:notesMasterIdLst>
-    <p:notesMasterId r:id="rId20"/>
+    <p:notesMasterId r:id="rId24"/>
   </p:notesMasterIdLst>
   <p:handoutMasterIdLst>
-    <p:handoutMasterId r:id="rId21"/>
+    <p:handoutMasterId r:id="rId25"/>
   </p:handoutMasterIdLst>
   <p:sldIdLst>
     <p:sldId id="256" r:id="rId2"/>
@@ -27,8 +27,12 @@
     <p:sldId id="286" r:id="rId15"/>
     <p:sldId id="287" r:id="rId16"/>
     <p:sldId id="276" r:id="rId17"/>
-    <p:sldId id="267" r:id="rId18"/>
-    <p:sldId id="272" r:id="rId19"/>
+    <p:sldId id="290" r:id="rId18"/>
+    <p:sldId id="289" r:id="rId19"/>
+    <p:sldId id="291" r:id="rId20"/>
+    <p:sldId id="292" r:id="rId21"/>
+    <p:sldId id="267" r:id="rId22"/>
+    <p:sldId id="272" r:id="rId23"/>
   </p:sldIdLst>
   <p:sldSz cx="9144000" cy="6858000" type="screen4x3"/>
   <p:notesSz cx="6858000" cy="9144000"/>
@@ -129,7 +133,7 @@
   </p:defaultTextStyle>
   <p:extLst>
     <p:ext uri="{EFAFB233-063F-42B5-8137-9DF3F51BA10A}">
-      <p15:sldGuideLst xmlns:p15="http://schemas.microsoft.com/office/powerpoint/2012/main" xmlns="">
+      <p15:sldGuideLst xmlns:p15="http://schemas.microsoft.com/office/powerpoint/2012/main">
         <p15:guide id="1" orient="horz" pos="2160">
           <p15:clr>
             <a:srgbClr val="A4A3A4"/>
@@ -143,7 +147,7 @@
       </p15:sldGuideLst>
     </p:ext>
     <p:ext uri="{2D200454-40CA-4A62-9FC3-DE9A4176ACB9}">
-      <p15:notesGuideLst xmlns:p15="http://schemas.microsoft.com/office/powerpoint/2012/main" xmlns=""/>
+      <p15:notesGuideLst xmlns:p15="http://schemas.microsoft.com/office/powerpoint/2012/main"/>
     </p:ext>
   </p:extLst>
 </p:presentation>
@@ -231,7 +235,7 @@
           <a:p>
             <a:fld id="{4B25F24D-90CF-44A7-A9EA-C384FF6564EC}" type="datetimeFigureOut">
               <a:rPr lang="de-CH" smtClean="0"/>
-              <a:t>15.11.2014</a:t>
+              <a:t>16.11.2014</a:t>
             </a:fld>
             <a:endParaRPr lang="de-CH"/>
           </a:p>
@@ -297,7 +301,7 @@
           <a:p>
             <a:fld id="{8FA47960-71E6-41D7-97C8-9D68B0218EF7}" type="slidenum">
               <a:rPr lang="de-CH" smtClean="0"/>
-              <a:t>‹#›</a:t>
+              <a:t>‹Nr.›</a:t>
             </a:fld>
             <a:endParaRPr lang="de-CH"/>
           </a:p>
@@ -396,7 +400,7 @@
           <a:p>
             <a:fld id="{F2686799-5163-409F-B733-C9681AE00980}" type="datetimeFigureOut">
               <a:rPr lang="de-CH" smtClean="0"/>
-              <a:t>15.11.2014</a:t>
+              <a:t>16.11.2014</a:t>
             </a:fld>
             <a:endParaRPr lang="de-CH"/>
           </a:p>
@@ -555,7 +559,7 @@
           <a:p>
             <a:fld id="{539D6FB8-A289-4D31-AE1B-368BC10F6FE7}" type="slidenum">
               <a:rPr lang="de-CH" smtClean="0"/>
-              <a:t>‹#›</a:t>
+              <a:t>‹Nr.›</a:t>
             </a:fld>
             <a:endParaRPr lang="de-CH"/>
           </a:p>
@@ -662,6 +666,174 @@
     </a:lvl9pPr>
   </p:notesStyle>
 </p:notesMaster>
+</file>
+
+<file path=ppt/notesSlides/notesSlide1.xml><?xml version="1.0" encoding="utf-8"?>
+<p:notes xmlns:a="http://schemas.openxmlformats.org/drawingml/2006/main" xmlns:r="http://schemas.openxmlformats.org/officeDocument/2006/relationships" xmlns:p="http://schemas.openxmlformats.org/presentationml/2006/main">
+  <p:cSld>
+    <p:spTree>
+      <p:nvGrpSpPr>
+        <p:cNvPr id="1" name=""/>
+        <p:cNvGrpSpPr/>
+        <p:nvPr/>
+      </p:nvGrpSpPr>
+      <p:grpSpPr>
+        <a:xfrm>
+          <a:off x="0" y="0"/>
+          <a:ext cx="0" cy="0"/>
+          <a:chOff x="0" y="0"/>
+          <a:chExt cx="0" cy="0"/>
+        </a:xfrm>
+      </p:grpSpPr>
+      <p:sp>
+        <p:nvSpPr>
+          <p:cNvPr id="2" name="Folienbildplatzhalter 1"/>
+          <p:cNvSpPr>
+            <a:spLocks noGrp="1" noRot="1" noChangeAspect="1"/>
+          </p:cNvSpPr>
+          <p:nvPr>
+            <p:ph type="sldImg"/>
+          </p:nvPr>
+        </p:nvSpPr>
+        <p:spPr/>
+      </p:sp>
+      <p:sp>
+        <p:nvSpPr>
+          <p:cNvPr id="3" name="Notizenplatzhalter 2"/>
+          <p:cNvSpPr>
+            <a:spLocks noGrp="1"/>
+          </p:cNvSpPr>
+          <p:nvPr>
+            <p:ph type="body" idx="1"/>
+          </p:nvPr>
+        </p:nvSpPr>
+        <p:spPr/>
+        <p:txBody>
+          <a:bodyPr/>
+          <a:lstStyle/>
+          <a:p>
+            <a:endParaRPr lang="de-CH" dirty="0"/>
+          </a:p>
+        </p:txBody>
+      </p:sp>
+      <p:sp>
+        <p:nvSpPr>
+          <p:cNvPr id="4" name="Foliennummernplatzhalter 3"/>
+          <p:cNvSpPr>
+            <a:spLocks noGrp="1"/>
+          </p:cNvSpPr>
+          <p:nvPr>
+            <p:ph type="sldNum" sz="quarter" idx="10"/>
+          </p:nvPr>
+        </p:nvSpPr>
+        <p:spPr/>
+        <p:txBody>
+          <a:bodyPr/>
+          <a:lstStyle/>
+          <a:p>
+            <a:fld id="{539D6FB8-A289-4D31-AE1B-368BC10F6FE7}" type="slidenum">
+              <a:rPr lang="de-CH" smtClean="0"/>
+              <a:t>17</a:t>
+            </a:fld>
+            <a:endParaRPr lang="de-CH"/>
+          </a:p>
+        </p:txBody>
+      </p:sp>
+    </p:spTree>
+    <p:extLst>
+      <p:ext uri="{BB962C8B-B14F-4D97-AF65-F5344CB8AC3E}">
+        <p14:creationId xmlns:p14="http://schemas.microsoft.com/office/powerpoint/2010/main" val="2106664737"/>
+      </p:ext>
+    </p:extLst>
+  </p:cSld>
+  <p:clrMapOvr>
+    <a:masterClrMapping/>
+  </p:clrMapOvr>
+</p:notes>
+</file>
+
+<file path=ppt/notesSlides/notesSlide2.xml><?xml version="1.0" encoding="utf-8"?>
+<p:notes xmlns:a="http://schemas.openxmlformats.org/drawingml/2006/main" xmlns:r="http://schemas.openxmlformats.org/officeDocument/2006/relationships" xmlns:p="http://schemas.openxmlformats.org/presentationml/2006/main">
+  <p:cSld>
+    <p:spTree>
+      <p:nvGrpSpPr>
+        <p:cNvPr id="1" name=""/>
+        <p:cNvGrpSpPr/>
+        <p:nvPr/>
+      </p:nvGrpSpPr>
+      <p:grpSpPr>
+        <a:xfrm>
+          <a:off x="0" y="0"/>
+          <a:ext cx="0" cy="0"/>
+          <a:chOff x="0" y="0"/>
+          <a:chExt cx="0" cy="0"/>
+        </a:xfrm>
+      </p:grpSpPr>
+      <p:sp>
+        <p:nvSpPr>
+          <p:cNvPr id="2" name="Folienbildplatzhalter 1"/>
+          <p:cNvSpPr>
+            <a:spLocks noGrp="1" noRot="1" noChangeAspect="1"/>
+          </p:cNvSpPr>
+          <p:nvPr>
+            <p:ph type="sldImg"/>
+          </p:nvPr>
+        </p:nvSpPr>
+        <p:spPr/>
+      </p:sp>
+      <p:sp>
+        <p:nvSpPr>
+          <p:cNvPr id="3" name="Notizenplatzhalter 2"/>
+          <p:cNvSpPr>
+            <a:spLocks noGrp="1"/>
+          </p:cNvSpPr>
+          <p:nvPr>
+            <p:ph type="body" idx="1"/>
+          </p:nvPr>
+        </p:nvSpPr>
+        <p:spPr/>
+        <p:txBody>
+          <a:bodyPr/>
+          <a:lstStyle/>
+          <a:p>
+            <a:endParaRPr lang="de-CH" dirty="0"/>
+          </a:p>
+        </p:txBody>
+      </p:sp>
+      <p:sp>
+        <p:nvSpPr>
+          <p:cNvPr id="4" name="Foliennummernplatzhalter 3"/>
+          <p:cNvSpPr>
+            <a:spLocks noGrp="1"/>
+          </p:cNvSpPr>
+          <p:nvPr>
+            <p:ph type="sldNum" sz="quarter" idx="10"/>
+          </p:nvPr>
+        </p:nvSpPr>
+        <p:spPr/>
+        <p:txBody>
+          <a:bodyPr/>
+          <a:lstStyle/>
+          <a:p>
+            <a:fld id="{539D6FB8-A289-4D31-AE1B-368BC10F6FE7}" type="slidenum">
+              <a:rPr lang="de-CH" smtClean="0"/>
+              <a:t>20</a:t>
+            </a:fld>
+            <a:endParaRPr lang="de-CH"/>
+          </a:p>
+        </p:txBody>
+      </p:sp>
+    </p:spTree>
+    <p:extLst>
+      <p:ext uri="{BB962C8B-B14F-4D97-AF65-F5344CB8AC3E}">
+        <p14:creationId xmlns:p14="http://schemas.microsoft.com/office/powerpoint/2010/main" val="1011459683"/>
+      </p:ext>
+    </p:extLst>
+  </p:cSld>
+  <p:clrMapOvr>
+    <a:masterClrMapping/>
+  </p:clrMapOvr>
+</p:notes>
 </file>
 
 <file path=ppt/slideLayouts/slideLayout1.xml><?xml version="1.0" encoding="utf-8"?>
@@ -836,7 +1008,7 @@
           <a:p>
             <a:fld id="{1BA50D42-C9CD-4801-B293-61D1F53EC57E}" type="datetimeFigureOut">
               <a:rPr lang="de-DE" smtClean="0"/>
-              <a:t>15.11.2014</a:t>
+              <a:t>16.11.2014</a:t>
             </a:fld>
             <a:endParaRPr lang="de-DE"/>
           </a:p>
@@ -894,7 +1066,7 @@
           <a:p>
             <a:fld id="{6C6AE60A-B69C-4790-82F7-3882EDF23186}" type="slidenum">
               <a:rPr lang="de-DE" smtClean="0"/>
-              <a:t>‹#›</a:t>
+              <a:t>‹Nr.›</a:t>
             </a:fld>
             <a:endParaRPr lang="de-DE"/>
           </a:p>
@@ -1035,7 +1207,7 @@
           <a:p>
             <a:fld id="{1BA50D42-C9CD-4801-B293-61D1F53EC57E}" type="datetimeFigureOut">
               <a:rPr lang="de-DE" smtClean="0"/>
-              <a:t>15.11.2014</a:t>
+              <a:t>16.11.2014</a:t>
             </a:fld>
             <a:endParaRPr lang="de-DE"/>
           </a:p>
@@ -1093,7 +1265,7 @@
           <a:p>
             <a:fld id="{6C6AE60A-B69C-4790-82F7-3882EDF23186}" type="slidenum">
               <a:rPr lang="de-DE" smtClean="0"/>
-              <a:t>‹#›</a:t>
+              <a:t>‹Nr.›</a:t>
             </a:fld>
             <a:endParaRPr lang="de-DE"/>
           </a:p>
@@ -1588,7 +1760,7 @@
           <a:p>
             <a:fld id="{1BA50D42-C9CD-4801-B293-61D1F53EC57E}" type="datetimeFigureOut">
               <a:rPr lang="de-DE" smtClean="0"/>
-              <a:t>15.11.2014</a:t>
+              <a:t>16.11.2014</a:t>
             </a:fld>
             <a:endParaRPr lang="de-DE"/>
           </a:p>
@@ -1619,7 +1791,7 @@
           <a:p>
             <a:fld id="{6C6AE60A-B69C-4790-82F7-3882EDF23186}" type="slidenum">
               <a:rPr lang="de-DE" smtClean="0"/>
-              <a:t>‹#›</a:t>
+              <a:t>‹Nr.›</a:t>
             </a:fld>
             <a:endParaRPr lang="de-DE"/>
           </a:p>
@@ -1858,7 +2030,7 @@
           <a:p>
             <a:fld id="{1BA50D42-C9CD-4801-B293-61D1F53EC57E}" type="datetimeFigureOut">
               <a:rPr lang="de-DE" smtClean="0"/>
-              <a:t>15.11.2014</a:t>
+              <a:t>16.11.2014</a:t>
             </a:fld>
             <a:endParaRPr lang="de-DE"/>
           </a:p>
@@ -1916,7 +2088,7 @@
           <a:p>
             <a:fld id="{6C6AE60A-B69C-4790-82F7-3882EDF23186}" type="slidenum">
               <a:rPr lang="de-DE" smtClean="0"/>
-              <a:t>‹#›</a:t>
+              <a:t>‹Nr.›</a:t>
             </a:fld>
             <a:endParaRPr lang="de-DE"/>
           </a:p>
@@ -2011,7 +2183,7 @@
           <a:p>
             <a:fld id="{1BA50D42-C9CD-4801-B293-61D1F53EC57E}" type="datetimeFigureOut">
               <a:rPr lang="de-DE" smtClean="0"/>
-              <a:t>15.11.2014</a:t>
+              <a:t>16.11.2014</a:t>
             </a:fld>
             <a:endParaRPr lang="de-DE"/>
           </a:p>
@@ -2069,7 +2241,7 @@
           <a:p>
             <a:fld id="{6C6AE60A-B69C-4790-82F7-3882EDF23186}" type="slidenum">
               <a:rPr lang="de-DE" smtClean="0"/>
-              <a:t>‹#›</a:t>
+              <a:t>‹Nr.›</a:t>
             </a:fld>
             <a:endParaRPr lang="de-DE"/>
           </a:p>
@@ -2393,7 +2565,7 @@
           <a:p>
             <a:fld id="{1BA50D42-C9CD-4801-B293-61D1F53EC57E}" type="datetimeFigureOut">
               <a:rPr lang="de-DE" smtClean="0"/>
-              <a:t>15.11.2014</a:t>
+              <a:t>16.11.2014</a:t>
             </a:fld>
             <a:endParaRPr lang="de-DE"/>
           </a:p>
@@ -2451,7 +2623,7 @@
           <a:p>
             <a:fld id="{6C6AE60A-B69C-4790-82F7-3882EDF23186}" type="slidenum">
               <a:rPr lang="de-DE" smtClean="0"/>
-              <a:t>‹#›</a:t>
+              <a:t>‹Nr.›</a:t>
             </a:fld>
             <a:endParaRPr lang="de-DE"/>
           </a:p>
@@ -2696,7 +2868,7 @@
           <a:p>
             <a:fld id="{1BA50D42-C9CD-4801-B293-61D1F53EC57E}" type="datetimeFigureOut">
               <a:rPr lang="de-DE" smtClean="0"/>
-              <a:t>15.11.2014</a:t>
+              <a:t>16.11.2014</a:t>
             </a:fld>
             <a:endParaRPr lang="de-DE"/>
           </a:p>
@@ -2754,7 +2926,7 @@
           <a:p>
             <a:fld id="{6C6AE60A-B69C-4790-82F7-3882EDF23186}" type="slidenum">
               <a:rPr lang="de-DE" smtClean="0"/>
-              <a:t>‹#›</a:t>
+              <a:t>‹Nr.›</a:t>
             </a:fld>
             <a:endParaRPr lang="de-DE"/>
           </a:p>
@@ -10803,30 +10975,15 @@
               <a:rPr lang="de-CH" sz="2400" dirty="0" smtClean="0">
                 <a:sym typeface="Wingdings" panose="05000000000000000000" pitchFamily="2" charset="2"/>
               </a:rPr>
-              <a:t>kentert nach </a:t>
+              <a:t>kentert nach links</a:t>
             </a:r>
-            <a:r>
-              <a:rPr lang="de-CH" sz="2400" dirty="0" smtClean="0">
-                <a:sym typeface="Wingdings" panose="05000000000000000000" pitchFamily="2" charset="2"/>
-              </a:rPr>
-              <a:t>links</a:t>
-            </a:r>
-            <a:endParaRPr lang="de-CH" sz="2400" dirty="0" smtClean="0">
-              <a:sym typeface="Wingdings" panose="05000000000000000000" pitchFamily="2" charset="2"/>
-            </a:endParaRPr>
           </a:p>
           <a:p>
             <a:r>
               <a:rPr lang="de-CH" sz="2400" dirty="0" smtClean="0">
                 <a:sym typeface="Wingdings" panose="05000000000000000000" pitchFamily="2" charset="2"/>
               </a:rPr>
-              <a:t>Werte &lt; -1   das Schiff kentert nach </a:t>
-            </a:r>
-            <a:r>
-              <a:rPr lang="de-CH" sz="2400" dirty="0" smtClean="0">
-                <a:sym typeface="Wingdings" panose="05000000000000000000" pitchFamily="2" charset="2"/>
-              </a:rPr>
-              <a:t>rechts</a:t>
+              <a:t>Werte &lt; -1   das Schiff kentert nach rechts</a:t>
             </a:r>
             <a:endParaRPr lang="de-CH" sz="2400" dirty="0"/>
           </a:p>
@@ -11397,10 +11554,376 @@
           <a:bodyPr/>
           <a:lstStyle/>
           <a:p>
-            <a:endParaRPr lang="de-CH"/>
+            <a:r>
+              <a:rPr lang="de-CH" dirty="0" smtClean="0"/>
+              <a:t>Modularer Aufbau</a:t>
+            </a:r>
+          </a:p>
+          <a:p>
+            <a:pPr lvl="1"/>
+            <a:r>
+              <a:rPr lang="de-CH" dirty="0" smtClean="0"/>
+              <a:t>Weniger </a:t>
+            </a:r>
+            <a:r>
+              <a:rPr lang="de-CH" dirty="0" smtClean="0"/>
+              <a:t>Speicherplatz</a:t>
+            </a:r>
+          </a:p>
+          <a:p>
+            <a:pPr lvl="1"/>
+            <a:r>
+              <a:rPr lang="de-CH" dirty="0" smtClean="0"/>
+              <a:t>Mehr Flexibilität</a:t>
+            </a:r>
+            <a:endParaRPr lang="de-CH" dirty="0"/>
           </a:p>
         </p:txBody>
       </p:sp>
+      <p:grpSp>
+        <p:nvGrpSpPr>
+          <p:cNvPr id="9" name="Gruppieren 8"/>
+          <p:cNvGrpSpPr/>
+          <p:nvPr/>
+        </p:nvGrpSpPr>
+        <p:grpSpPr>
+          <a:xfrm>
+            <a:off x="1835696" y="3212976"/>
+            <a:ext cx="5201306" cy="955797"/>
+            <a:chOff x="324268" y="2362333"/>
+            <a:chExt cx="11609278" cy="2133333"/>
+          </a:xfrm>
+          <a:effectLst>
+            <a:outerShdw blurRad="50800" dist="127000" dir="2700000" algn="tl" rotWithShape="0">
+              <a:prstClr val="black">
+                <a:alpha val="40000"/>
+              </a:prstClr>
+            </a:outerShdw>
+          </a:effectLst>
+        </p:grpSpPr>
+        <p:pic>
+          <p:nvPicPr>
+            <p:cNvPr id="4" name="Grafik 3"/>
+            <p:cNvPicPr>
+              <a:picLocks noChangeAspect="1"/>
+            </p:cNvPicPr>
+            <p:nvPr/>
+          </p:nvPicPr>
+          <p:blipFill>
+            <a:blip r:embed="rId2">
+              <a:extLst>
+                <a:ext uri="{28A0092B-C50C-407E-A947-70E740481C1C}">
+                  <a14:useLocalDpi xmlns:a14="http://schemas.microsoft.com/office/drawing/2010/main" val="0"/>
+                </a:ext>
+              </a:extLst>
+            </a:blip>
+            <a:stretch>
+              <a:fillRect/>
+            </a:stretch>
+          </p:blipFill>
+          <p:spPr>
+            <a:xfrm>
+              <a:off x="3505333" y="2362333"/>
+              <a:ext cx="2133333" cy="2133333"/>
+            </a:xfrm>
+            <a:prstGeom prst="rect">
+              <a:avLst/>
+            </a:prstGeom>
+          </p:spPr>
+        </p:pic>
+        <p:pic>
+          <p:nvPicPr>
+            <p:cNvPr id="5" name="Grafik 4"/>
+            <p:cNvPicPr>
+              <a:picLocks noChangeAspect="1"/>
+            </p:cNvPicPr>
+            <p:nvPr/>
+          </p:nvPicPr>
+          <p:blipFill>
+            <a:blip r:embed="rId3">
+              <a:extLst>
+                <a:ext uri="{28A0092B-C50C-407E-A947-70E740481C1C}">
+                  <a14:useLocalDpi xmlns:a14="http://schemas.microsoft.com/office/drawing/2010/main" val="0"/>
+                </a:ext>
+              </a:extLst>
+            </a:blip>
+            <a:stretch>
+              <a:fillRect/>
+            </a:stretch>
+          </p:blipFill>
+          <p:spPr>
+            <a:xfrm>
+              <a:off x="324268" y="2362333"/>
+              <a:ext cx="2133333" cy="2133333"/>
+            </a:xfrm>
+            <a:prstGeom prst="rect">
+              <a:avLst/>
+            </a:prstGeom>
+          </p:spPr>
+        </p:pic>
+        <p:pic>
+          <p:nvPicPr>
+            <p:cNvPr id="6" name="Grafik 5"/>
+            <p:cNvPicPr>
+              <a:picLocks noChangeAspect="1"/>
+            </p:cNvPicPr>
+            <p:nvPr/>
+          </p:nvPicPr>
+          <p:blipFill>
+            <a:blip r:embed="rId4">
+              <a:extLst>
+                <a:ext uri="{28A0092B-C50C-407E-A947-70E740481C1C}">
+                  <a14:useLocalDpi xmlns:a14="http://schemas.microsoft.com/office/drawing/2010/main" val="0"/>
+                </a:ext>
+              </a:extLst>
+            </a:blip>
+            <a:stretch>
+              <a:fillRect/>
+            </a:stretch>
+          </p:blipFill>
+          <p:spPr>
+            <a:xfrm>
+              <a:off x="7126986" y="2362333"/>
+              <a:ext cx="2133333" cy="2133333"/>
+            </a:xfrm>
+            <a:prstGeom prst="rect">
+              <a:avLst/>
+            </a:prstGeom>
+          </p:spPr>
+        </p:pic>
+        <p:pic>
+          <p:nvPicPr>
+            <p:cNvPr id="7" name="Grafik 6"/>
+            <p:cNvPicPr>
+              <a:picLocks noChangeAspect="1"/>
+            </p:cNvPicPr>
+            <p:nvPr/>
+          </p:nvPicPr>
+          <p:blipFill>
+            <a:blip r:embed="rId5">
+              <a:extLst>
+                <a:ext uri="{28A0092B-C50C-407E-A947-70E740481C1C}">
+                  <a14:useLocalDpi xmlns:a14="http://schemas.microsoft.com/office/drawing/2010/main" val="0"/>
+                </a:ext>
+              </a:extLst>
+            </a:blip>
+            <a:stretch>
+              <a:fillRect/>
+            </a:stretch>
+          </p:blipFill>
+          <p:spPr>
+            <a:xfrm>
+              <a:off x="11628784" y="3073444"/>
+              <a:ext cx="304762" cy="711111"/>
+            </a:xfrm>
+            <a:prstGeom prst="rect">
+              <a:avLst/>
+            </a:prstGeom>
+          </p:spPr>
+        </p:pic>
+        <p:pic>
+          <p:nvPicPr>
+            <p:cNvPr id="8" name="Grafik 7"/>
+            <p:cNvPicPr>
+              <a:picLocks noChangeAspect="1"/>
+            </p:cNvPicPr>
+            <p:nvPr/>
+          </p:nvPicPr>
+          <p:blipFill>
+            <a:blip r:embed="rId6">
+              <a:extLst>
+                <a:ext uri="{28A0092B-C50C-407E-A947-70E740481C1C}">
+                  <a14:useLocalDpi xmlns:a14="http://schemas.microsoft.com/office/drawing/2010/main" val="0"/>
+                </a:ext>
+              </a:extLst>
+            </a:blip>
+            <a:stretch>
+              <a:fillRect/>
+            </a:stretch>
+          </p:blipFill>
+          <p:spPr>
+            <a:xfrm>
+              <a:off x="9924881" y="2921063"/>
+              <a:ext cx="609524" cy="1015873"/>
+            </a:xfrm>
+            <a:prstGeom prst="rect">
+              <a:avLst/>
+            </a:prstGeom>
+          </p:spPr>
+        </p:pic>
+      </p:grpSp>
+      <p:grpSp>
+        <p:nvGrpSpPr>
+          <p:cNvPr id="16" name="Gruppieren 15"/>
+          <p:cNvGrpSpPr/>
+          <p:nvPr/>
+        </p:nvGrpSpPr>
+        <p:grpSpPr>
+          <a:xfrm>
+            <a:off x="873988" y="4628739"/>
+            <a:ext cx="7396024" cy="1680622"/>
+            <a:chOff x="505369" y="4681356"/>
+            <a:chExt cx="7396024" cy="1680622"/>
+          </a:xfrm>
+          <a:effectLst>
+            <a:outerShdw blurRad="50800" dist="127000" dir="2700000" algn="tl" rotWithShape="0">
+              <a:prstClr val="black">
+                <a:alpha val="40000"/>
+              </a:prstClr>
+            </a:outerShdw>
+          </a:effectLst>
+        </p:grpSpPr>
+        <p:pic>
+          <p:nvPicPr>
+            <p:cNvPr id="10" name="Grafik 9"/>
+            <p:cNvPicPr>
+              <a:picLocks noChangeAspect="1"/>
+            </p:cNvPicPr>
+            <p:nvPr/>
+          </p:nvPicPr>
+          <p:blipFill>
+            <a:blip r:embed="rId7" cstate="print">
+              <a:extLst>
+                <a:ext uri="{28A0092B-C50C-407E-A947-70E740481C1C}">
+                  <a14:useLocalDpi xmlns:a14="http://schemas.microsoft.com/office/drawing/2010/main" val="0"/>
+                </a:ext>
+              </a:extLst>
+            </a:blip>
+            <a:stretch>
+              <a:fillRect/>
+            </a:stretch>
+          </p:blipFill>
+          <p:spPr>
+            <a:xfrm>
+              <a:off x="3206562" y="5077809"/>
+              <a:ext cx="690137" cy="1281683"/>
+            </a:xfrm>
+            <a:prstGeom prst="rect">
+              <a:avLst/>
+            </a:prstGeom>
+          </p:spPr>
+        </p:pic>
+        <p:pic>
+          <p:nvPicPr>
+            <p:cNvPr id="11" name="Grafik 10"/>
+            <p:cNvPicPr>
+              <a:picLocks noChangeAspect="1"/>
+            </p:cNvPicPr>
+            <p:nvPr/>
+          </p:nvPicPr>
+          <p:blipFill>
+            <a:blip r:embed="rId8" cstate="print">
+              <a:extLst>
+                <a:ext uri="{28A0092B-C50C-407E-A947-70E740481C1C}">
+                  <a14:useLocalDpi xmlns:a14="http://schemas.microsoft.com/office/drawing/2010/main" val="0"/>
+                </a:ext>
+              </a:extLst>
+            </a:blip>
+            <a:stretch>
+              <a:fillRect/>
+            </a:stretch>
+          </p:blipFill>
+          <p:spPr>
+            <a:xfrm>
+              <a:off x="1242607" y="4913491"/>
+              <a:ext cx="1610320" cy="1446001"/>
+            </a:xfrm>
+            <a:prstGeom prst="rect">
+              <a:avLst/>
+            </a:prstGeom>
+          </p:spPr>
+        </p:pic>
+        <p:pic>
+          <p:nvPicPr>
+            <p:cNvPr id="12" name="Grafik 11"/>
+            <p:cNvPicPr>
+              <a:picLocks noChangeAspect="1"/>
+            </p:cNvPicPr>
+            <p:nvPr/>
+          </p:nvPicPr>
+          <p:blipFill>
+            <a:blip r:embed="rId9" cstate="print">
+              <a:extLst>
+                <a:ext uri="{28A0092B-C50C-407E-A947-70E740481C1C}">
+                  <a14:useLocalDpi xmlns:a14="http://schemas.microsoft.com/office/drawing/2010/main" val="0"/>
+                </a:ext>
+              </a:extLst>
+            </a:blip>
+            <a:stretch>
+              <a:fillRect/>
+            </a:stretch>
+          </p:blipFill>
+          <p:spPr>
+            <a:xfrm>
+              <a:off x="4250334" y="4948840"/>
+              <a:ext cx="1938956" cy="1413138"/>
+            </a:xfrm>
+            <a:prstGeom prst="rect">
+              <a:avLst/>
+            </a:prstGeom>
+          </p:spPr>
+        </p:pic>
+        <p:pic>
+          <p:nvPicPr>
+            <p:cNvPr id="13" name="Grafik 12"/>
+            <p:cNvPicPr>
+              <a:picLocks noChangeAspect="1"/>
+            </p:cNvPicPr>
+            <p:nvPr/>
+          </p:nvPicPr>
+          <p:blipFill>
+            <a:blip r:embed="rId10" cstate="print">
+              <a:extLst>
+                <a:ext uri="{28A0092B-C50C-407E-A947-70E740481C1C}">
+                  <a14:useLocalDpi xmlns:a14="http://schemas.microsoft.com/office/drawing/2010/main" val="0"/>
+                </a:ext>
+              </a:extLst>
+            </a:blip>
+            <a:stretch>
+              <a:fillRect/>
+            </a:stretch>
+          </p:blipFill>
+          <p:spPr>
+            <a:xfrm>
+              <a:off x="6685437" y="4681356"/>
+              <a:ext cx="1215956" cy="1643183"/>
+            </a:xfrm>
+            <a:prstGeom prst="rect">
+              <a:avLst/>
+            </a:prstGeom>
+          </p:spPr>
+        </p:pic>
+        <p:pic>
+          <p:nvPicPr>
+            <p:cNvPr id="15" name="Grafik 14"/>
+            <p:cNvPicPr>
+              <a:picLocks noChangeAspect="1"/>
+            </p:cNvPicPr>
+            <p:nvPr/>
+          </p:nvPicPr>
+          <p:blipFill>
+            <a:blip r:embed="rId11">
+              <a:extLst>
+                <a:ext uri="{28A0092B-C50C-407E-A947-70E740481C1C}">
+                  <a14:useLocalDpi xmlns:a14="http://schemas.microsoft.com/office/drawing/2010/main" val="0"/>
+                </a:ext>
+              </a:extLst>
+            </a:blip>
+            <a:stretch>
+              <a:fillRect/>
+            </a:stretch>
+          </p:blipFill>
+          <p:spPr>
+            <a:xfrm>
+              <a:off x="505369" y="5159264"/>
+              <a:ext cx="241091" cy="1165275"/>
+            </a:xfrm>
+            <a:prstGeom prst="rect">
+              <a:avLst/>
+            </a:prstGeom>
+          </p:spPr>
+        </p:pic>
+      </p:grpSp>
     </p:spTree>
     <p:extLst>
       <p:ext uri="{BB962C8B-B14F-4D97-AF65-F5344CB8AC3E}">
@@ -11445,28 +11968,321 @@
             <a:spLocks noGrp="1"/>
           </p:cNvSpPr>
           <p:nvPr>
-            <p:ph type="ctrTitle"/>
+            <p:ph type="title"/>
           </p:nvPr>
         </p:nvSpPr>
         <p:spPr/>
         <p:txBody>
           <a:bodyPr>
-            <a:normAutofit/>
+            <a:normAutofit fontScale="90000"/>
           </a:bodyPr>
           <a:lstStyle/>
           <a:p>
             <a:r>
               <a:rPr lang="de-CH" dirty="0" smtClean="0"/>
-              <a:t>Fragen?</a:t>
+              <a:t>Grafik</a:t>
             </a:r>
             <a:endParaRPr lang="de-CH" dirty="0"/>
+          </a:p>
+        </p:txBody>
+      </p:sp>
+      <p:sp>
+        <p:nvSpPr>
+          <p:cNvPr id="3" name="Inhaltsplatzhalter 2"/>
+          <p:cNvSpPr>
+            <a:spLocks noGrp="1"/>
+          </p:cNvSpPr>
+          <p:nvPr>
+            <p:ph idx="1"/>
+          </p:nvPr>
+        </p:nvSpPr>
+        <p:spPr/>
+        <p:txBody>
+          <a:bodyPr/>
+          <a:lstStyle/>
+          <a:p>
+            <a:r>
+              <a:rPr lang="de-CH" dirty="0" smtClean="0"/>
+              <a:t>Textur Atlas</a:t>
+            </a:r>
+          </a:p>
+          <a:p>
+            <a:pPr lvl="1"/>
+            <a:r>
+              <a:rPr lang="de-CH" dirty="0" smtClean="0"/>
+              <a:t>Weniger Filezugriffe</a:t>
+            </a:r>
+          </a:p>
+          <a:p>
+            <a:pPr lvl="1"/>
+            <a:r>
+              <a:rPr lang="de-CH" dirty="0" smtClean="0"/>
+              <a:t>Effizienter für OpenGL</a:t>
+            </a:r>
+          </a:p>
+          <a:p>
+            <a:pPr lvl="2"/>
+            <a:r>
+              <a:rPr lang="de-CH" dirty="0" smtClean="0"/>
+              <a:t>Power </a:t>
+            </a:r>
+            <a:r>
+              <a:rPr lang="de-CH" dirty="0" err="1" smtClean="0"/>
+              <a:t>of</a:t>
+            </a:r>
+            <a:r>
+              <a:rPr lang="de-CH" dirty="0" smtClean="0"/>
+              <a:t> </a:t>
+            </a:r>
+            <a:r>
+              <a:rPr lang="de-CH" dirty="0" err="1" smtClean="0"/>
+              <a:t>two</a:t>
+            </a:r>
+            <a:r>
+              <a:rPr lang="de-CH" dirty="0" smtClean="0"/>
+              <a:t> Textur</a:t>
+            </a:r>
+          </a:p>
+          <a:p>
+            <a:pPr lvl="2"/>
+            <a:r>
+              <a:rPr lang="de-CH" dirty="0" smtClean="0"/>
+              <a:t>Weniger </a:t>
+            </a:r>
+            <a:r>
+              <a:rPr lang="de-CH" dirty="0" err="1" smtClean="0"/>
+              <a:t>Texture</a:t>
+            </a:r>
+            <a:r>
+              <a:rPr lang="de-CH" dirty="0" smtClean="0"/>
+              <a:t> </a:t>
+            </a:r>
+            <a:r>
+              <a:rPr lang="de-CH" dirty="0" err="1" smtClean="0"/>
+              <a:t>Bindings</a:t>
+            </a:r>
+            <a:endParaRPr lang="de-CH" dirty="0" smtClean="0"/>
+          </a:p>
+          <a:p>
+            <a:pPr lvl="1"/>
+            <a:r>
+              <a:rPr lang="de-CH" dirty="0" smtClean="0"/>
+              <a:t>Zugriff auf Textur Regionen per Label</a:t>
+            </a:r>
+          </a:p>
+          <a:p>
+            <a:pPr lvl="2"/>
+            <a:r>
+              <a:rPr lang="de-CH" dirty="0" smtClean="0"/>
+              <a:t>Bezeichnung unabhängig vom </a:t>
+            </a:r>
+            <a:r>
+              <a:rPr lang="de-CH" dirty="0" err="1" smtClean="0"/>
+              <a:t>Datetyp</a:t>
+            </a:r>
+            <a:endParaRPr lang="de-CH" dirty="0"/>
+          </a:p>
+          <a:p>
+            <a:endParaRPr lang="de-CH" dirty="0"/>
+          </a:p>
+        </p:txBody>
+      </p:sp>
+      <p:pic>
+        <p:nvPicPr>
+          <p:cNvPr id="4" name="Grafik 3"/>
+          <p:cNvPicPr>
+            <a:picLocks noChangeAspect="1"/>
+          </p:cNvPicPr>
+          <p:nvPr/>
+        </p:nvPicPr>
+        <p:blipFill>
+          <a:blip r:embed="rId3" cstate="print">
+            <a:extLst>
+              <a:ext uri="{28A0092B-C50C-407E-A947-70E740481C1C}">
+                <a14:useLocalDpi xmlns:a14="http://schemas.microsoft.com/office/drawing/2010/main" val="0"/>
+              </a:ext>
+            </a:extLst>
+          </a:blip>
+          <a:stretch>
+            <a:fillRect/>
+          </a:stretch>
+        </p:blipFill>
+        <p:spPr>
+          <a:xfrm>
+            <a:off x="538480" y="4801640"/>
+            <a:ext cx="8426008" cy="1053251"/>
+          </a:xfrm>
+          <a:prstGeom prst="rect">
+            <a:avLst/>
+          </a:prstGeom>
+          <a:ln>
+            <a:solidFill>
+              <a:schemeClr val="tx1"/>
+            </a:solidFill>
+          </a:ln>
+          <a:effectLst>
+            <a:outerShdw blurRad="50800" dist="127000" dir="2700000" algn="tl" rotWithShape="0">
+              <a:prstClr val="black">
+                <a:alpha val="40000"/>
+              </a:prstClr>
+            </a:outerShdw>
+          </a:effectLst>
+        </p:spPr>
+      </p:pic>
+      <p:cxnSp>
+        <p:nvCxnSpPr>
+          <p:cNvPr id="6" name="Gerader Verbinder 5"/>
+          <p:cNvCxnSpPr/>
+          <p:nvPr/>
+        </p:nvCxnSpPr>
+        <p:spPr>
+          <a:xfrm>
+            <a:off x="538480" y="6097784"/>
+            <a:ext cx="8426008" cy="0"/>
+          </a:xfrm>
+          <a:prstGeom prst="line">
+            <a:avLst/>
+          </a:prstGeom>
+          <a:ln w="38100">
+            <a:solidFill>
+              <a:schemeClr val="tx2"/>
+            </a:solidFill>
+            <a:headEnd type="arrow" w="lg" len="lg"/>
+            <a:tailEnd type="arrow" w="lg" len="lg"/>
+          </a:ln>
+        </p:spPr>
+        <p:style>
+          <a:lnRef idx="1">
+            <a:schemeClr val="accent1"/>
+          </a:lnRef>
+          <a:fillRef idx="0">
+            <a:schemeClr val="accent1"/>
+          </a:fillRef>
+          <a:effectRef idx="0">
+            <a:schemeClr val="accent1"/>
+          </a:effectRef>
+          <a:fontRef idx="minor">
+            <a:schemeClr val="tx1"/>
+          </a:fontRef>
+        </p:style>
+      </p:cxnSp>
+      <p:cxnSp>
+        <p:nvCxnSpPr>
+          <p:cNvPr id="8" name="Gerader Verbinder 7"/>
+          <p:cNvCxnSpPr/>
+          <p:nvPr/>
+        </p:nvCxnSpPr>
+        <p:spPr>
+          <a:xfrm flipV="1">
+            <a:off x="358996" y="4801640"/>
+            <a:ext cx="0" cy="1053251"/>
+          </a:xfrm>
+          <a:prstGeom prst="line">
+            <a:avLst/>
+          </a:prstGeom>
+          <a:ln w="38100">
+            <a:solidFill>
+              <a:schemeClr val="tx2"/>
+            </a:solidFill>
+            <a:headEnd type="arrow" w="lg" len="lg"/>
+            <a:tailEnd type="arrow" w="lg" len="lg"/>
+          </a:ln>
+        </p:spPr>
+        <p:style>
+          <a:lnRef idx="1">
+            <a:schemeClr val="accent1"/>
+          </a:lnRef>
+          <a:fillRef idx="0">
+            <a:schemeClr val="accent1"/>
+          </a:fillRef>
+          <a:effectRef idx="0">
+            <a:schemeClr val="accent1"/>
+          </a:effectRef>
+          <a:fontRef idx="minor">
+            <a:schemeClr val="tx1"/>
+          </a:fontRef>
+        </p:style>
+      </p:cxnSp>
+      <p:sp>
+        <p:nvSpPr>
+          <p:cNvPr id="11" name="Textfeld 10"/>
+          <p:cNvSpPr txBox="1"/>
+          <p:nvPr/>
+        </p:nvSpPr>
+        <p:spPr>
+          <a:xfrm>
+            <a:off x="4095472" y="6156012"/>
+            <a:ext cx="936104" cy="369332"/>
+          </a:xfrm>
+          <a:prstGeom prst="rect">
+            <a:avLst/>
+          </a:prstGeom>
+          <a:noFill/>
+        </p:spPr>
+        <p:txBody>
+          <a:bodyPr wrap="square" rtlCol="0">
+            <a:spAutoFit/>
+          </a:bodyPr>
+          <a:lstStyle/>
+          <a:p>
+            <a:r>
+              <a:rPr lang="de-CH" dirty="0" smtClean="0">
+                <a:solidFill>
+                  <a:schemeClr val="tx2"/>
+                </a:solidFill>
+              </a:rPr>
+              <a:t>1024px</a:t>
+            </a:r>
+            <a:endParaRPr lang="de-CH" dirty="0">
+              <a:solidFill>
+                <a:schemeClr val="tx2"/>
+              </a:solidFill>
+            </a:endParaRPr>
+          </a:p>
+        </p:txBody>
+      </p:sp>
+      <p:sp>
+        <p:nvSpPr>
+          <p:cNvPr id="12" name="Textfeld 11"/>
+          <p:cNvSpPr txBox="1"/>
+          <p:nvPr/>
+        </p:nvSpPr>
+        <p:spPr>
+          <a:xfrm>
+            <a:off x="-13925" y="4432308"/>
+            <a:ext cx="936104" cy="369332"/>
+          </a:xfrm>
+          <a:prstGeom prst="rect">
+            <a:avLst/>
+          </a:prstGeom>
+          <a:noFill/>
+        </p:spPr>
+        <p:txBody>
+          <a:bodyPr wrap="square" rtlCol="0">
+            <a:spAutoFit/>
+          </a:bodyPr>
+          <a:lstStyle/>
+          <a:p>
+            <a:r>
+              <a:rPr lang="de-CH" dirty="0" smtClean="0">
+                <a:solidFill>
+                  <a:schemeClr val="tx2"/>
+                </a:solidFill>
+              </a:rPr>
+              <a:t>128px</a:t>
+            </a:r>
+            <a:endParaRPr lang="de-CH" dirty="0">
+              <a:solidFill>
+                <a:schemeClr val="tx2"/>
+              </a:solidFill>
+            </a:endParaRPr>
           </a:p>
         </p:txBody>
       </p:sp>
     </p:spTree>
     <p:extLst>
       <p:ext uri="{BB962C8B-B14F-4D97-AF65-F5344CB8AC3E}">
-        <p14:creationId xmlns:p14="http://schemas.microsoft.com/office/powerpoint/2010/main" val="887838879"/>
+        <p14:creationId xmlns:p14="http://schemas.microsoft.com/office/powerpoint/2010/main" val="3797515652"/>
       </p:ext>
     </p:extLst>
   </p:cSld>
@@ -11507,7 +12323,32 @@
             <a:spLocks noGrp="1"/>
           </p:cNvSpPr>
           <p:nvPr>
-            <p:ph type="ctrTitle"/>
+            <p:ph type="title"/>
+          </p:nvPr>
+        </p:nvSpPr>
+        <p:spPr/>
+        <p:txBody>
+          <a:bodyPr>
+            <a:normAutofit fontScale="90000"/>
+          </a:bodyPr>
+          <a:lstStyle/>
+          <a:p>
+            <a:r>
+              <a:rPr lang="de-CH" dirty="0" smtClean="0"/>
+              <a:t>Grafik</a:t>
+            </a:r>
+            <a:endParaRPr lang="de-CH" dirty="0"/>
+          </a:p>
+        </p:txBody>
+      </p:sp>
+      <p:sp>
+        <p:nvSpPr>
+          <p:cNvPr id="3" name="Inhaltsplatzhalter 2"/>
+          <p:cNvSpPr>
+            <a:spLocks noGrp="1"/>
+          </p:cNvSpPr>
+          <p:nvPr>
+            <p:ph idx="1"/>
           </p:nvPr>
         </p:nvSpPr>
         <p:spPr/>
@@ -11515,18 +12356,122 @@
           <a:bodyPr/>
           <a:lstStyle/>
           <a:p>
-            <a:endParaRPr lang="de-DE"/>
+            <a:r>
+              <a:rPr lang="de-CH" dirty="0" smtClean="0"/>
+              <a:t>Workflow:</a:t>
+            </a:r>
+          </a:p>
+          <a:p>
+            <a:pPr marL="560070" indent="-514350">
+              <a:buFont typeface="+mj-lt"/>
+              <a:buAutoNum type="arabicPeriod"/>
+            </a:pPr>
+            <a:r>
+              <a:rPr lang="de-CH" dirty="0" smtClean="0"/>
+              <a:t>Bilder in Photoshop erstellen</a:t>
+            </a:r>
+          </a:p>
+          <a:p>
+            <a:pPr marL="560070" indent="-514350">
+              <a:buFont typeface="+mj-lt"/>
+              <a:buAutoNum type="arabicPeriod"/>
+            </a:pPr>
+            <a:r>
+              <a:rPr lang="de-CH" dirty="0" smtClean="0"/>
+              <a:t>Per PS-Script Ebenen als Files exportieren</a:t>
+            </a:r>
+          </a:p>
+          <a:p>
+            <a:pPr marL="560070" indent="-514350">
+              <a:buFont typeface="+mj-lt"/>
+              <a:buAutoNum type="arabicPeriod"/>
+            </a:pPr>
+            <a:r>
+              <a:rPr lang="de-CH" dirty="0" smtClean="0"/>
+              <a:t>Mit libGDX-</a:t>
+            </a:r>
+            <a:r>
+              <a:rPr lang="de-CH" dirty="0" err="1" smtClean="0"/>
+              <a:t>TexturePacker</a:t>
+            </a:r>
+            <a:r>
+              <a:rPr lang="de-CH" dirty="0" smtClean="0"/>
+              <a:t> Atlas erstellen</a:t>
+            </a:r>
+            <a:endParaRPr lang="de-CH" dirty="0"/>
+          </a:p>
+        </p:txBody>
+      </p:sp>
+    </p:spTree>
+    <p:extLst>
+      <p:ext uri="{BB962C8B-B14F-4D97-AF65-F5344CB8AC3E}">
+        <p14:creationId xmlns:p14="http://schemas.microsoft.com/office/powerpoint/2010/main" val="3289957506"/>
+      </p:ext>
+    </p:extLst>
+  </p:cSld>
+  <p:clrMapOvr>
+    <a:masterClrMapping/>
+  </p:clrMapOvr>
+  <p:timing>
+    <p:tnLst>
+      <p:par>
+        <p:cTn id="1" dur="indefinite" restart="never" nodeType="tmRoot"/>
+      </p:par>
+    </p:tnLst>
+  </p:timing>
+</p:sld>
+</file>
+
+<file path=ppt/slides/slide19.xml><?xml version="1.0" encoding="utf-8"?>
+<p:sld xmlns:a="http://schemas.openxmlformats.org/drawingml/2006/main" xmlns:r="http://schemas.openxmlformats.org/officeDocument/2006/relationships" xmlns:p="http://schemas.openxmlformats.org/presentationml/2006/main">
+  <p:cSld>
+    <p:spTree>
+      <p:nvGrpSpPr>
+        <p:cNvPr id="1" name=""/>
+        <p:cNvGrpSpPr/>
+        <p:nvPr/>
+      </p:nvGrpSpPr>
+      <p:grpSpPr>
+        <a:xfrm>
+          <a:off x="0" y="0"/>
+          <a:ext cx="0" cy="0"/>
+          <a:chOff x="0" y="0"/>
+          <a:chExt cx="0" cy="0"/>
+        </a:xfrm>
+      </p:grpSpPr>
+      <p:sp>
+        <p:nvSpPr>
+          <p:cNvPr id="2" name="Titel 1"/>
+          <p:cNvSpPr>
+            <a:spLocks noGrp="1"/>
+          </p:cNvSpPr>
+          <p:nvPr>
+            <p:ph type="title"/>
+          </p:nvPr>
+        </p:nvSpPr>
+        <p:spPr/>
+        <p:txBody>
+          <a:bodyPr>
+            <a:normAutofit fontScale="90000"/>
+          </a:bodyPr>
+          <a:lstStyle/>
+          <a:p>
+            <a:r>
+              <a:rPr lang="de-CH" dirty="0" smtClean="0"/>
+              <a:t>Grafik</a:t>
+            </a:r>
+            <a:endParaRPr lang="de-CH" dirty="0"/>
           </a:p>
         </p:txBody>
       </p:sp>
       <p:sp>
         <p:nvSpPr>
-          <p:cNvPr id="3" name="Untertitel 2"/>
+          <p:cNvPr id="3" name="Inhaltsplatzhalter 2"/>
           <p:cNvSpPr>
             <a:spLocks noGrp="1"/>
           </p:cNvSpPr>
           <p:nvPr>
-            <p:ph type="subTitle" idx="1"/>
+            <p:ph idx="1"/>
           </p:nvPr>
         </p:nvSpPr>
         <p:spPr/>
@@ -11534,14 +12479,206 @@
           <a:bodyPr/>
           <a:lstStyle/>
           <a:p>
-            <a:endParaRPr lang="de-DE"/>
+            <a:r>
+              <a:rPr lang="de-CH" dirty="0" smtClean="0"/>
+              <a:t>Problem:</a:t>
+            </a:r>
+          </a:p>
+          <a:p>
+            <a:r>
+              <a:rPr lang="de-CH" dirty="0" smtClean="0"/>
+              <a:t>Lösung:</a:t>
+            </a:r>
+          </a:p>
+          <a:p>
+            <a:r>
+              <a:rPr lang="de-CH" dirty="0" smtClean="0"/>
+              <a:t>GL_NEAREST anstatt GL_LINEAR als </a:t>
+            </a:r>
+            <a:r>
+              <a:rPr lang="de-CH" dirty="0" err="1" smtClean="0"/>
+              <a:t>TextureFilter</a:t>
+            </a:r>
+            <a:r>
+              <a:rPr lang="de-CH" dirty="0" smtClean="0"/>
+              <a:t> verwenden</a:t>
+            </a:r>
+            <a:endParaRPr lang="de-CH" dirty="0"/>
+          </a:p>
+        </p:txBody>
+      </p:sp>
+      <p:pic>
+        <p:nvPicPr>
+          <p:cNvPr id="5" name="Grafik 4"/>
+          <p:cNvPicPr>
+            <a:picLocks noChangeAspect="1"/>
+          </p:cNvPicPr>
+          <p:nvPr/>
+        </p:nvPicPr>
+        <p:blipFill>
+          <a:blip r:embed="rId2" cstate="print">
+            <a:extLst>
+              <a:ext uri="{28A0092B-C50C-407E-A947-70E740481C1C}">
+                <a14:useLocalDpi xmlns:a14="http://schemas.microsoft.com/office/drawing/2010/main" val="0"/>
+              </a:ext>
+            </a:extLst>
+          </a:blip>
+          <a:stretch>
+            <a:fillRect/>
+          </a:stretch>
+        </p:blipFill>
+        <p:spPr>
+          <a:xfrm>
+            <a:off x="551500" y="1959795"/>
+            <a:ext cx="7092280" cy="4493582"/>
+          </a:xfrm>
+          <a:prstGeom prst="rect">
+            <a:avLst/>
+          </a:prstGeom>
+        </p:spPr>
+      </p:pic>
+      <p:sp>
+        <p:nvSpPr>
+          <p:cNvPr id="6" name="Rechteck 5"/>
+          <p:cNvSpPr/>
+          <p:nvPr/>
+        </p:nvSpPr>
+        <p:spPr>
+          <a:xfrm>
+            <a:off x="827584" y="5445224"/>
+            <a:ext cx="1440160" cy="720080"/>
+          </a:xfrm>
+          <a:prstGeom prst="rect">
+            <a:avLst/>
+          </a:prstGeom>
+          <a:noFill/>
+          <a:ln w="38100">
+            <a:solidFill>
+              <a:schemeClr val="tx2"/>
+            </a:solidFill>
+          </a:ln>
+        </p:spPr>
+        <p:style>
+          <a:lnRef idx="2">
+            <a:schemeClr val="accent1">
+              <a:shade val="50000"/>
+            </a:schemeClr>
+          </a:lnRef>
+          <a:fillRef idx="1">
+            <a:schemeClr val="accent1"/>
+          </a:fillRef>
+          <a:effectRef idx="0">
+            <a:schemeClr val="accent1"/>
+          </a:effectRef>
+          <a:fontRef idx="minor">
+            <a:schemeClr val="lt1"/>
+          </a:fontRef>
+        </p:style>
+        <p:txBody>
+          <a:bodyPr rtlCol="0" anchor="ctr"/>
+          <a:lstStyle/>
+          <a:p>
+            <a:pPr algn="ctr"/>
+            <a:endParaRPr lang="de-CH"/>
+          </a:p>
+        </p:txBody>
+      </p:sp>
+      <p:sp>
+        <p:nvSpPr>
+          <p:cNvPr id="7" name="Rechteck 6"/>
+          <p:cNvSpPr/>
+          <p:nvPr/>
+        </p:nvSpPr>
+        <p:spPr>
+          <a:xfrm>
+            <a:off x="5724128" y="5445224"/>
+            <a:ext cx="1440160" cy="720080"/>
+          </a:xfrm>
+          <a:prstGeom prst="rect">
+            <a:avLst/>
+          </a:prstGeom>
+          <a:noFill/>
+          <a:ln w="38100">
+            <a:solidFill>
+              <a:schemeClr val="tx2"/>
+            </a:solidFill>
+          </a:ln>
+        </p:spPr>
+        <p:style>
+          <a:lnRef idx="2">
+            <a:schemeClr val="accent1">
+              <a:shade val="50000"/>
+            </a:schemeClr>
+          </a:lnRef>
+          <a:fillRef idx="1">
+            <a:schemeClr val="accent1"/>
+          </a:fillRef>
+          <a:effectRef idx="0">
+            <a:schemeClr val="accent1"/>
+          </a:effectRef>
+          <a:fontRef idx="minor">
+            <a:schemeClr val="lt1"/>
+          </a:fontRef>
+        </p:style>
+        <p:txBody>
+          <a:bodyPr rtlCol="0" anchor="ctr"/>
+          <a:lstStyle/>
+          <a:p>
+            <a:pPr algn="ctr"/>
+            <a:endParaRPr lang="de-CH"/>
+          </a:p>
+        </p:txBody>
+      </p:sp>
+      <p:sp>
+        <p:nvSpPr>
+          <p:cNvPr id="10" name="Rechteck 9"/>
+          <p:cNvSpPr/>
+          <p:nvPr/>
+        </p:nvSpPr>
+        <p:spPr>
+          <a:xfrm>
+            <a:off x="5508104" y="2204864"/>
+            <a:ext cx="576064" cy="576064"/>
+          </a:xfrm>
+          <a:prstGeom prst="rect">
+            <a:avLst/>
+          </a:prstGeom>
+          <a:noFill/>
+          <a:ln w="38100">
+            <a:solidFill>
+              <a:schemeClr val="tx2"/>
+            </a:solidFill>
+          </a:ln>
+        </p:spPr>
+        <p:style>
+          <a:lnRef idx="2">
+            <a:schemeClr val="accent1">
+              <a:shade val="50000"/>
+            </a:schemeClr>
+          </a:lnRef>
+          <a:fillRef idx="1">
+            <a:schemeClr val="accent1"/>
+          </a:fillRef>
+          <a:effectRef idx="0">
+            <a:schemeClr val="accent1"/>
+          </a:effectRef>
+          <a:fontRef idx="minor">
+            <a:schemeClr val="lt1"/>
+          </a:fontRef>
+        </p:style>
+        <p:txBody>
+          <a:bodyPr rtlCol="0" anchor="ctr"/>
+          <a:lstStyle/>
+          <a:p>
+            <a:pPr algn="ctr"/>
+            <a:endParaRPr lang="de-CH"/>
           </a:p>
         </p:txBody>
       </p:sp>
     </p:spTree>
     <p:extLst>
       <p:ext uri="{BB962C8B-B14F-4D97-AF65-F5344CB8AC3E}">
-        <p14:creationId xmlns:p14="http://schemas.microsoft.com/office/powerpoint/2010/main" val="2250555948"/>
+        <p14:creationId xmlns:p14="http://schemas.microsoft.com/office/powerpoint/2010/main" val="3519344095"/>
       </p:ext>
     </p:extLst>
   </p:cSld>
@@ -11623,6 +12760,304 @@
     <p:extLst>
       <p:ext uri="{BB962C8B-B14F-4D97-AF65-F5344CB8AC3E}">
         <p14:creationId xmlns:p14="http://schemas.microsoft.com/office/powerpoint/2010/main" val="284351435"/>
+      </p:ext>
+    </p:extLst>
+  </p:cSld>
+  <p:clrMapOvr>
+    <a:masterClrMapping/>
+  </p:clrMapOvr>
+  <p:timing>
+    <p:tnLst>
+      <p:par>
+        <p:cTn id="1" dur="indefinite" restart="never" nodeType="tmRoot"/>
+      </p:par>
+    </p:tnLst>
+  </p:timing>
+</p:sld>
+</file>
+
+<file path=ppt/slides/slide20.xml><?xml version="1.0" encoding="utf-8"?>
+<p:sld xmlns:a="http://schemas.openxmlformats.org/drawingml/2006/main" xmlns:r="http://schemas.openxmlformats.org/officeDocument/2006/relationships" xmlns:p="http://schemas.openxmlformats.org/presentationml/2006/main">
+  <p:cSld>
+    <p:spTree>
+      <p:nvGrpSpPr>
+        <p:cNvPr id="1" name=""/>
+        <p:cNvGrpSpPr/>
+        <p:nvPr/>
+      </p:nvGrpSpPr>
+      <p:grpSpPr>
+        <a:xfrm>
+          <a:off x="0" y="0"/>
+          <a:ext cx="0" cy="0"/>
+          <a:chOff x="0" y="0"/>
+          <a:chExt cx="0" cy="0"/>
+        </a:xfrm>
+      </p:grpSpPr>
+      <p:sp>
+        <p:nvSpPr>
+          <p:cNvPr id="2" name="Titel 1"/>
+          <p:cNvSpPr>
+            <a:spLocks noGrp="1"/>
+          </p:cNvSpPr>
+          <p:nvPr>
+            <p:ph type="title"/>
+          </p:nvPr>
+        </p:nvSpPr>
+        <p:spPr/>
+        <p:txBody>
+          <a:bodyPr>
+            <a:normAutofit fontScale="90000"/>
+          </a:bodyPr>
+          <a:lstStyle/>
+          <a:p>
+            <a:r>
+              <a:rPr lang="de-CH" dirty="0" smtClean="0"/>
+              <a:t>Grafik</a:t>
+            </a:r>
+            <a:endParaRPr lang="de-CH" dirty="0"/>
+          </a:p>
+        </p:txBody>
+      </p:sp>
+      <p:sp>
+        <p:nvSpPr>
+          <p:cNvPr id="3" name="Inhaltsplatzhalter 2"/>
+          <p:cNvSpPr>
+            <a:spLocks noGrp="1"/>
+          </p:cNvSpPr>
+          <p:nvPr>
+            <p:ph idx="1"/>
+          </p:nvPr>
+        </p:nvSpPr>
+        <p:spPr/>
+        <p:txBody>
+          <a:bodyPr/>
+          <a:lstStyle/>
+          <a:p>
+            <a:r>
+              <a:rPr lang="de-CH" dirty="0" smtClean="0"/>
+              <a:t>Ursache:</a:t>
+            </a:r>
+          </a:p>
+          <a:p>
+            <a:pPr lvl="1"/>
+            <a:r>
+              <a:rPr lang="de-CH" dirty="0" smtClean="0"/>
+              <a:t>Rundungs- und Interpolationsfehler</a:t>
+            </a:r>
+          </a:p>
+          <a:p>
+            <a:r>
+              <a:rPr lang="de-CH" dirty="0" smtClean="0"/>
+              <a:t>Lösung:</a:t>
+            </a:r>
+          </a:p>
+          <a:p>
+            <a:pPr lvl="1"/>
+            <a:r>
+              <a:rPr lang="de-CH" dirty="0" smtClean="0"/>
+              <a:t>GL_NEAREST anstatt GL_LINEAR als </a:t>
+            </a:r>
+            <a:r>
+              <a:rPr lang="de-CH" dirty="0" err="1" smtClean="0"/>
+              <a:t>TextureFilter</a:t>
+            </a:r>
+            <a:r>
+              <a:rPr lang="de-CH" dirty="0" smtClean="0"/>
+              <a:t> verwenden</a:t>
+            </a:r>
+          </a:p>
+          <a:p>
+            <a:pPr lvl="1"/>
+            <a:r>
+              <a:rPr lang="de-CH" dirty="0" err="1" smtClean="0"/>
+              <a:t>TexturePacker</a:t>
+            </a:r>
+            <a:r>
+              <a:rPr lang="de-CH" dirty="0" smtClean="0"/>
+              <a:t> so konfigurieren, das Randpixel dupliziert werden</a:t>
+            </a:r>
+            <a:endParaRPr lang="de-CH" dirty="0"/>
+          </a:p>
+        </p:txBody>
+      </p:sp>
+      <p:pic>
+        <p:nvPicPr>
+          <p:cNvPr id="4" name="Grafik 3"/>
+          <p:cNvPicPr>
+            <a:picLocks noChangeAspect="1"/>
+          </p:cNvPicPr>
+          <p:nvPr/>
+        </p:nvPicPr>
+        <p:blipFill>
+          <a:blip r:embed="rId3">
+            <a:extLst>
+              <a:ext uri="{28A0092B-C50C-407E-A947-70E740481C1C}">
+                <a14:useLocalDpi xmlns:a14="http://schemas.microsoft.com/office/drawing/2010/main" val="0"/>
+              </a:ext>
+            </a:extLst>
+          </a:blip>
+          <a:stretch>
+            <a:fillRect/>
+          </a:stretch>
+        </p:blipFill>
+        <p:spPr>
+          <a:xfrm>
+            <a:off x="945912" y="4797152"/>
+            <a:ext cx="6876256" cy="1820935"/>
+          </a:xfrm>
+          <a:prstGeom prst="rect">
+            <a:avLst/>
+          </a:prstGeom>
+          <a:effectLst>
+            <a:outerShdw blurRad="50800" dist="127000" dir="2700000" algn="tl" rotWithShape="0">
+              <a:prstClr val="black">
+                <a:alpha val="40000"/>
+              </a:prstClr>
+            </a:outerShdw>
+          </a:effectLst>
+        </p:spPr>
+      </p:pic>
+    </p:spTree>
+    <p:extLst>
+      <p:ext uri="{BB962C8B-B14F-4D97-AF65-F5344CB8AC3E}">
+        <p14:creationId xmlns:p14="http://schemas.microsoft.com/office/powerpoint/2010/main" val="3375961068"/>
+      </p:ext>
+    </p:extLst>
+  </p:cSld>
+  <p:clrMapOvr>
+    <a:masterClrMapping/>
+  </p:clrMapOvr>
+  <p:timing>
+    <p:tnLst>
+      <p:par>
+        <p:cTn id="1" dur="indefinite" restart="never" nodeType="tmRoot"/>
+      </p:par>
+    </p:tnLst>
+  </p:timing>
+</p:sld>
+</file>
+
+<file path=ppt/slides/slide21.xml><?xml version="1.0" encoding="utf-8"?>
+<p:sld xmlns:a="http://schemas.openxmlformats.org/drawingml/2006/main" xmlns:r="http://schemas.openxmlformats.org/officeDocument/2006/relationships" xmlns:p="http://schemas.openxmlformats.org/presentationml/2006/main">
+  <p:cSld>
+    <p:spTree>
+      <p:nvGrpSpPr>
+        <p:cNvPr id="1" name=""/>
+        <p:cNvGrpSpPr/>
+        <p:nvPr/>
+      </p:nvGrpSpPr>
+      <p:grpSpPr>
+        <a:xfrm>
+          <a:off x="0" y="0"/>
+          <a:ext cx="0" cy="0"/>
+          <a:chOff x="0" y="0"/>
+          <a:chExt cx="0" cy="0"/>
+        </a:xfrm>
+      </p:grpSpPr>
+      <p:sp>
+        <p:nvSpPr>
+          <p:cNvPr id="2" name="Titel 1"/>
+          <p:cNvSpPr>
+            <a:spLocks noGrp="1"/>
+          </p:cNvSpPr>
+          <p:nvPr>
+            <p:ph type="ctrTitle"/>
+          </p:nvPr>
+        </p:nvSpPr>
+        <p:spPr/>
+        <p:txBody>
+          <a:bodyPr>
+            <a:normAutofit/>
+          </a:bodyPr>
+          <a:lstStyle/>
+          <a:p>
+            <a:r>
+              <a:rPr lang="de-CH" dirty="0" smtClean="0"/>
+              <a:t>Fragen?</a:t>
+            </a:r>
+            <a:endParaRPr lang="de-CH" dirty="0"/>
+          </a:p>
+        </p:txBody>
+      </p:sp>
+    </p:spTree>
+    <p:extLst>
+      <p:ext uri="{BB962C8B-B14F-4D97-AF65-F5344CB8AC3E}">
+        <p14:creationId xmlns:p14="http://schemas.microsoft.com/office/powerpoint/2010/main" val="887838879"/>
+      </p:ext>
+    </p:extLst>
+  </p:cSld>
+  <p:clrMapOvr>
+    <a:masterClrMapping/>
+  </p:clrMapOvr>
+  <p:timing>
+    <p:tnLst>
+      <p:par>
+        <p:cTn id="1" dur="indefinite" restart="never" nodeType="tmRoot"/>
+      </p:par>
+    </p:tnLst>
+  </p:timing>
+</p:sld>
+</file>
+
+<file path=ppt/slides/slide22.xml><?xml version="1.0" encoding="utf-8"?>
+<p:sld xmlns:a="http://schemas.openxmlformats.org/drawingml/2006/main" xmlns:r="http://schemas.openxmlformats.org/officeDocument/2006/relationships" xmlns:p="http://schemas.openxmlformats.org/presentationml/2006/main">
+  <p:cSld>
+    <p:spTree>
+      <p:nvGrpSpPr>
+        <p:cNvPr id="1" name=""/>
+        <p:cNvGrpSpPr/>
+        <p:nvPr/>
+      </p:nvGrpSpPr>
+      <p:grpSpPr>
+        <a:xfrm>
+          <a:off x="0" y="0"/>
+          <a:ext cx="0" cy="0"/>
+          <a:chOff x="0" y="0"/>
+          <a:chExt cx="0" cy="0"/>
+        </a:xfrm>
+      </p:grpSpPr>
+      <p:sp>
+        <p:nvSpPr>
+          <p:cNvPr id="2" name="Titel 1"/>
+          <p:cNvSpPr>
+            <a:spLocks noGrp="1"/>
+          </p:cNvSpPr>
+          <p:nvPr>
+            <p:ph type="ctrTitle"/>
+          </p:nvPr>
+        </p:nvSpPr>
+        <p:spPr/>
+        <p:txBody>
+          <a:bodyPr/>
+          <a:lstStyle/>
+          <a:p>
+            <a:endParaRPr lang="de-DE"/>
+          </a:p>
+        </p:txBody>
+      </p:sp>
+      <p:sp>
+        <p:nvSpPr>
+          <p:cNvPr id="3" name="Untertitel 2"/>
+          <p:cNvSpPr>
+            <a:spLocks noGrp="1"/>
+          </p:cNvSpPr>
+          <p:nvPr>
+            <p:ph type="subTitle" idx="1"/>
+          </p:nvPr>
+        </p:nvSpPr>
+        <p:spPr/>
+        <p:txBody>
+          <a:bodyPr/>
+          <a:lstStyle/>
+          <a:p>
+            <a:endParaRPr lang="de-DE"/>
+          </a:p>
+        </p:txBody>
+      </p:sp>
+    </p:spTree>
+    <p:extLst>
+      <p:ext uri="{BB962C8B-B14F-4D97-AF65-F5344CB8AC3E}">
+        <p14:creationId xmlns:p14="http://schemas.microsoft.com/office/powerpoint/2010/main" val="2250555948"/>
       </p:ext>
     </p:extLst>
   </p:cSld>
@@ -18903,7 +20338,7 @@
   <a:extraClrSchemeLst/>
   <a:extLst>
     <a:ext uri="{05A4C25C-085E-4340-85A3-A5531E510DB2}">
-      <thm15:themeFamily xmlns:thm15="http://schemas.microsoft.com/office/thememl/2012/main" xmlns="" name="Office Theme" id="{62F939B6-93AF-4DB8-9C6B-D6C7DFDC589F}" vid="{4A3C46E8-61CC-4603-A589-7422A47A8E4A}"/>
+      <thm15:themeFamily xmlns:thm15="http://schemas.microsoft.com/office/thememl/2012/main" name="Office Theme" id="{62F939B6-93AF-4DB8-9C6B-D6C7DFDC589F}" vid="{4A3C46E8-61CC-4603-A589-7422A47A8E4A}"/>
     </a:ext>
   </a:extLst>
 </a:theme>

</xml_diff>

<commit_message>
Kleine Korrekturen in der Präsentation
</commit_message>
<xml_diff>
--- a/Documents/Design/Design_Präsentation_v1.pptx
+++ b/Documents/Design/Design_Präsentation_v1.pptx
@@ -235,7 +235,7 @@
           <a:p>
             <a:fld id="{4B25F24D-90CF-44A7-A9EA-C384FF6564EC}" type="datetimeFigureOut">
               <a:rPr lang="de-CH" smtClean="0"/>
-              <a:t>16.11.2014</a:t>
+              <a:t>17.11.2014</a:t>
             </a:fld>
             <a:endParaRPr lang="de-CH"/>
           </a:p>
@@ -400,7 +400,7 @@
           <a:p>
             <a:fld id="{F2686799-5163-409F-B733-C9681AE00980}" type="datetimeFigureOut">
               <a:rPr lang="de-CH" smtClean="0"/>
-              <a:t>16.11.2014</a:t>
+              <a:t>17.11.2014</a:t>
             </a:fld>
             <a:endParaRPr lang="de-CH"/>
           </a:p>
@@ -1008,7 +1008,7 @@
           <a:p>
             <a:fld id="{1BA50D42-C9CD-4801-B293-61D1F53EC57E}" type="datetimeFigureOut">
               <a:rPr lang="de-DE" smtClean="0"/>
-              <a:t>16.11.2014</a:t>
+              <a:t>17.11.2014</a:t>
             </a:fld>
             <a:endParaRPr lang="de-DE"/>
           </a:p>
@@ -1207,7 +1207,7 @@
           <a:p>
             <a:fld id="{1BA50D42-C9CD-4801-B293-61D1F53EC57E}" type="datetimeFigureOut">
               <a:rPr lang="de-DE" smtClean="0"/>
-              <a:t>16.11.2014</a:t>
+              <a:t>17.11.2014</a:t>
             </a:fld>
             <a:endParaRPr lang="de-DE"/>
           </a:p>
@@ -1760,7 +1760,7 @@
           <a:p>
             <a:fld id="{1BA50D42-C9CD-4801-B293-61D1F53EC57E}" type="datetimeFigureOut">
               <a:rPr lang="de-DE" smtClean="0"/>
-              <a:t>16.11.2014</a:t>
+              <a:t>17.11.2014</a:t>
             </a:fld>
             <a:endParaRPr lang="de-DE"/>
           </a:p>
@@ -2030,7 +2030,7 @@
           <a:p>
             <a:fld id="{1BA50D42-C9CD-4801-B293-61D1F53EC57E}" type="datetimeFigureOut">
               <a:rPr lang="de-DE" smtClean="0"/>
-              <a:t>16.11.2014</a:t>
+              <a:t>17.11.2014</a:t>
             </a:fld>
             <a:endParaRPr lang="de-DE"/>
           </a:p>
@@ -2183,7 +2183,7 @@
           <a:p>
             <a:fld id="{1BA50D42-C9CD-4801-B293-61D1F53EC57E}" type="datetimeFigureOut">
               <a:rPr lang="de-DE" smtClean="0"/>
-              <a:t>16.11.2014</a:t>
+              <a:t>17.11.2014</a:t>
             </a:fld>
             <a:endParaRPr lang="de-DE"/>
           </a:p>
@@ -2565,7 +2565,7 @@
           <a:p>
             <a:fld id="{1BA50D42-C9CD-4801-B293-61D1F53EC57E}" type="datetimeFigureOut">
               <a:rPr lang="de-DE" smtClean="0"/>
-              <a:t>16.11.2014</a:t>
+              <a:t>17.11.2014</a:t>
             </a:fld>
             <a:endParaRPr lang="de-DE"/>
           </a:p>
@@ -2868,7 +2868,7 @@
           <a:p>
             <a:fld id="{1BA50D42-C9CD-4801-B293-61D1F53EC57E}" type="datetimeFigureOut">
               <a:rPr lang="de-DE" smtClean="0"/>
-              <a:t>16.11.2014</a:t>
+              <a:t>17.11.2014</a:t>
             </a:fld>
             <a:endParaRPr lang="de-DE"/>
           </a:p>
@@ -3698,8 +3698,8 @@
               <a:t>Der Reihe nach in Liste einfügen und </a:t>
             </a:r>
             <a:r>
-              <a:rPr lang="de-CH" dirty="0" err="1" smtClean="0"/>
-              <a:t>mischeln</a:t>
+              <a:rPr lang="de-CH" dirty="0" smtClean="0"/>
+              <a:t>mischen</a:t>
             </a:r>
             <a:endParaRPr lang="de-CH" dirty="0" smtClean="0"/>
           </a:p>
@@ -11563,11 +11563,7 @@
             <a:pPr lvl="1"/>
             <a:r>
               <a:rPr lang="de-CH" dirty="0" smtClean="0"/>
-              <a:t>Weniger </a:t>
-            </a:r>
-            <a:r>
-              <a:rPr lang="de-CH" dirty="0" smtClean="0"/>
-              <a:t>Speicherplatz</a:t>
+              <a:t>Weniger Speicherplatz</a:t>
             </a:r>
           </a:p>
           <a:p>
@@ -12077,8 +12073,8 @@
               <a:t>Bezeichnung unabhängig vom </a:t>
             </a:r>
             <a:r>
-              <a:rPr lang="de-CH" dirty="0" err="1" smtClean="0"/>
-              <a:t>Datetyp</a:t>
+              <a:rPr lang="de-CH" dirty="0" smtClean="0"/>
+              <a:t>Datentyp</a:t>
             </a:r>
             <a:endParaRPr lang="de-CH" dirty="0"/>
           </a:p>
@@ -13016,44 +13012,6 @@
           <a:chExt cx="0" cy="0"/>
         </a:xfrm>
       </p:grpSpPr>
-      <p:sp>
-        <p:nvSpPr>
-          <p:cNvPr id="2" name="Titel 1"/>
-          <p:cNvSpPr>
-            <a:spLocks noGrp="1"/>
-          </p:cNvSpPr>
-          <p:nvPr>
-            <p:ph type="ctrTitle"/>
-          </p:nvPr>
-        </p:nvSpPr>
-        <p:spPr/>
-        <p:txBody>
-          <a:bodyPr/>
-          <a:lstStyle/>
-          <a:p>
-            <a:endParaRPr lang="de-DE"/>
-          </a:p>
-        </p:txBody>
-      </p:sp>
-      <p:sp>
-        <p:nvSpPr>
-          <p:cNvPr id="3" name="Untertitel 2"/>
-          <p:cNvSpPr>
-            <a:spLocks noGrp="1"/>
-          </p:cNvSpPr>
-          <p:nvPr>
-            <p:ph type="subTitle" idx="1"/>
-          </p:nvPr>
-        </p:nvSpPr>
-        <p:spPr/>
-        <p:txBody>
-          <a:bodyPr/>
-          <a:lstStyle/>
-          <a:p>
-            <a:endParaRPr lang="de-DE"/>
-          </a:p>
-        </p:txBody>
-      </p:sp>
     </p:spTree>
     <p:extLst>
       <p:ext uri="{BB962C8B-B14F-4D97-AF65-F5344CB8AC3E}">

</xml_diff>

<commit_message>
Mein Teil der Präsentation etwas angepasst.
</commit_message>
<xml_diff>
--- a/Documents/Design/Design_Präsentation_v1.pptx
+++ b/Documents/Design/Design_Präsentation_v1.pptx
@@ -5,10 +5,10 @@
     <p:sldMasterId id="2147483696" r:id="rId1"/>
   </p:sldMasterIdLst>
   <p:notesMasterIdLst>
-    <p:notesMasterId r:id="rId24"/>
+    <p:notesMasterId r:id="rId25"/>
   </p:notesMasterIdLst>
   <p:handoutMasterIdLst>
-    <p:handoutMasterId r:id="rId25"/>
+    <p:handoutMasterId r:id="rId26"/>
   </p:handoutMasterIdLst>
   <p:sldIdLst>
     <p:sldId id="256" r:id="rId2"/>
@@ -28,11 +28,12 @@
     <p:sldId id="287" r:id="rId16"/>
     <p:sldId id="276" r:id="rId17"/>
     <p:sldId id="290" r:id="rId18"/>
-    <p:sldId id="289" r:id="rId19"/>
-    <p:sldId id="291" r:id="rId20"/>
-    <p:sldId id="292" r:id="rId21"/>
-    <p:sldId id="267" r:id="rId22"/>
-    <p:sldId id="272" r:id="rId23"/>
+    <p:sldId id="293" r:id="rId19"/>
+    <p:sldId id="289" r:id="rId20"/>
+    <p:sldId id="291" r:id="rId21"/>
+    <p:sldId id="292" r:id="rId22"/>
+    <p:sldId id="267" r:id="rId23"/>
+    <p:sldId id="272" r:id="rId24"/>
   </p:sldIdLst>
   <p:sldSz cx="9144000" cy="6858000" type="screen4x3"/>
   <p:notesSz cx="6858000" cy="9144000"/>
@@ -235,7 +236,7 @@
           <a:p>
             <a:fld id="{4B25F24D-90CF-44A7-A9EA-C384FF6564EC}" type="datetimeFigureOut">
               <a:rPr lang="de-CH" smtClean="0"/>
-              <a:t>17.11.2014</a:t>
+              <a:t>18.11.2014</a:t>
             </a:fld>
             <a:endParaRPr lang="de-CH"/>
           </a:p>
@@ -400,7 +401,7 @@
           <a:p>
             <a:fld id="{F2686799-5163-409F-B733-C9681AE00980}" type="datetimeFigureOut">
               <a:rPr lang="de-CH" smtClean="0"/>
-              <a:t>17.11.2014</a:t>
+              <a:t>18.11.2014</a:t>
             </a:fld>
             <a:endParaRPr lang="de-CH"/>
           </a:p>
@@ -817,7 +818,7 @@
           <a:p>
             <a:fld id="{539D6FB8-A289-4D31-AE1B-368BC10F6FE7}" type="slidenum">
               <a:rPr lang="de-CH" smtClean="0"/>
-              <a:t>20</a:t>
+              <a:t>21</a:t>
             </a:fld>
             <a:endParaRPr lang="de-CH"/>
           </a:p>
@@ -1008,7 +1009,7 @@
           <a:p>
             <a:fld id="{1BA50D42-C9CD-4801-B293-61D1F53EC57E}" type="datetimeFigureOut">
               <a:rPr lang="de-DE" smtClean="0"/>
-              <a:t>17.11.2014</a:t>
+              <a:t>18.11.2014</a:t>
             </a:fld>
             <a:endParaRPr lang="de-DE"/>
           </a:p>
@@ -1207,7 +1208,7 @@
           <a:p>
             <a:fld id="{1BA50D42-C9CD-4801-B293-61D1F53EC57E}" type="datetimeFigureOut">
               <a:rPr lang="de-DE" smtClean="0"/>
-              <a:t>17.11.2014</a:t>
+              <a:t>18.11.2014</a:t>
             </a:fld>
             <a:endParaRPr lang="de-DE"/>
           </a:p>
@@ -1760,7 +1761,7 @@
           <a:p>
             <a:fld id="{1BA50D42-C9CD-4801-B293-61D1F53EC57E}" type="datetimeFigureOut">
               <a:rPr lang="de-DE" smtClean="0"/>
-              <a:t>17.11.2014</a:t>
+              <a:t>18.11.2014</a:t>
             </a:fld>
             <a:endParaRPr lang="de-DE"/>
           </a:p>
@@ -2030,7 +2031,7 @@
           <a:p>
             <a:fld id="{1BA50D42-C9CD-4801-B293-61D1F53EC57E}" type="datetimeFigureOut">
               <a:rPr lang="de-DE" smtClean="0"/>
-              <a:t>17.11.2014</a:t>
+              <a:t>18.11.2014</a:t>
             </a:fld>
             <a:endParaRPr lang="de-DE"/>
           </a:p>
@@ -2183,7 +2184,7 @@
           <a:p>
             <a:fld id="{1BA50D42-C9CD-4801-B293-61D1F53EC57E}" type="datetimeFigureOut">
               <a:rPr lang="de-DE" smtClean="0"/>
-              <a:t>17.11.2014</a:t>
+              <a:t>18.11.2014</a:t>
             </a:fld>
             <a:endParaRPr lang="de-DE"/>
           </a:p>
@@ -2565,7 +2566,7 @@
           <a:p>
             <a:fld id="{1BA50D42-C9CD-4801-B293-61D1F53EC57E}" type="datetimeFigureOut">
               <a:rPr lang="de-DE" smtClean="0"/>
-              <a:t>17.11.2014</a:t>
+              <a:t>18.11.2014</a:t>
             </a:fld>
             <a:endParaRPr lang="de-DE"/>
           </a:p>
@@ -2868,7 +2869,7 @@
           <a:p>
             <a:fld id="{1BA50D42-C9CD-4801-B293-61D1F53EC57E}" type="datetimeFigureOut">
               <a:rPr lang="de-DE" smtClean="0"/>
-              <a:t>17.11.2014</a:t>
+              <a:t>18.11.2014</a:t>
             </a:fld>
             <a:endParaRPr lang="de-DE"/>
           </a:p>
@@ -3695,13 +3696,8 @@
             <a:pPr lvl="1"/>
             <a:r>
               <a:rPr lang="de-CH" dirty="0" smtClean="0"/>
-              <a:t>Der Reihe nach in Liste einfügen und </a:t>
+              <a:t>Der Reihe nach in Liste einfügen und mischen</a:t>
             </a:r>
-            <a:r>
-              <a:rPr lang="de-CH" dirty="0" smtClean="0"/>
-              <a:t>mischen</a:t>
-            </a:r>
-            <a:endParaRPr lang="de-CH" dirty="0" smtClean="0"/>
           </a:p>
         </p:txBody>
       </p:sp>
@@ -12036,8 +12032,13 @@
             </a:r>
             <a:r>
               <a:rPr lang="de-CH" dirty="0" smtClean="0"/>
-              <a:t> Textur</a:t>
+              <a:t> </a:t>
             </a:r>
+            <a:r>
+              <a:rPr lang="de-CH" dirty="0" smtClean="0"/>
+              <a:t>Dimensionen</a:t>
+            </a:r>
+            <a:endParaRPr lang="de-CH" dirty="0" smtClean="0"/>
           </a:p>
           <a:p>
             <a:pPr lvl="2"/>
@@ -12058,25 +12059,6 @@
               <a:t>Bindings</a:t>
             </a:r>
             <a:endParaRPr lang="de-CH" dirty="0" smtClean="0"/>
-          </a:p>
-          <a:p>
-            <a:pPr lvl="1"/>
-            <a:r>
-              <a:rPr lang="de-CH" dirty="0" smtClean="0"/>
-              <a:t>Zugriff auf Textur Regionen per Label</a:t>
-            </a:r>
-          </a:p>
-          <a:p>
-            <a:pPr lvl="2"/>
-            <a:r>
-              <a:rPr lang="de-CH" dirty="0" smtClean="0"/>
-              <a:t>Bezeichnung unabhängig vom </a:t>
-            </a:r>
-            <a:r>
-              <a:rPr lang="de-CH" dirty="0" smtClean="0"/>
-              <a:t>Datentyp</a:t>
-            </a:r>
-            <a:endParaRPr lang="de-CH" dirty="0"/>
           </a:p>
           <a:p>
             <a:endParaRPr lang="de-CH" dirty="0"/>
@@ -12105,7 +12087,7 @@
         </p:blipFill>
         <p:spPr>
           <a:xfrm>
-            <a:off x="538480" y="4801640"/>
+            <a:off x="538480" y="4518412"/>
             <a:ext cx="8426008" cy="1053251"/>
           </a:xfrm>
           <a:prstGeom prst="rect">
@@ -12133,7 +12115,7 @@
         </p:nvCxnSpPr>
         <p:spPr>
           <a:xfrm>
-            <a:off x="538480" y="6097784"/>
+            <a:off x="538480" y="5814556"/>
             <a:ext cx="8426008" cy="0"/>
           </a:xfrm>
           <a:prstGeom prst="line">
@@ -12170,7 +12152,7 @@
         </p:nvCxnSpPr>
         <p:spPr>
           <a:xfrm flipV="1">
-            <a:off x="358996" y="4801640"/>
+            <a:off x="358996" y="4518412"/>
             <a:ext cx="0" cy="1053251"/>
           </a:xfrm>
           <a:prstGeom prst="line">
@@ -12207,7 +12189,7 @@
         </p:nvSpPr>
         <p:spPr>
           <a:xfrm>
-            <a:off x="4095472" y="6156012"/>
+            <a:off x="4095472" y="5872784"/>
             <a:ext cx="936104" cy="369332"/>
           </a:xfrm>
           <a:prstGeom prst="rect">
@@ -12245,7 +12227,7 @@
         </p:nvSpPr>
         <p:spPr>
           <a:xfrm>
-            <a:off x="-13925" y="4432308"/>
+            <a:off x="-13925" y="4149080"/>
             <a:ext cx="936104" cy="369332"/>
           </a:xfrm>
           <a:prstGeom prst="rect">
@@ -12296,6 +12278,238 @@
 </file>
 
 <file path=ppt/slides/slide18.xml><?xml version="1.0" encoding="utf-8"?>
+<p:sld xmlns:a="http://schemas.openxmlformats.org/drawingml/2006/main" xmlns:r="http://schemas.openxmlformats.org/officeDocument/2006/relationships" xmlns:p="http://schemas.openxmlformats.org/presentationml/2006/main">
+  <p:cSld>
+    <p:spTree>
+      <p:nvGrpSpPr>
+        <p:cNvPr id="1" name=""/>
+        <p:cNvGrpSpPr/>
+        <p:nvPr/>
+      </p:nvGrpSpPr>
+      <p:grpSpPr>
+        <a:xfrm>
+          <a:off x="0" y="0"/>
+          <a:ext cx="0" cy="0"/>
+          <a:chOff x="0" y="0"/>
+          <a:chExt cx="0" cy="0"/>
+        </a:xfrm>
+      </p:grpSpPr>
+      <p:sp>
+        <p:nvSpPr>
+          <p:cNvPr id="2" name="Titel 1"/>
+          <p:cNvSpPr>
+            <a:spLocks noGrp="1"/>
+          </p:cNvSpPr>
+          <p:nvPr>
+            <p:ph type="title"/>
+          </p:nvPr>
+        </p:nvSpPr>
+        <p:spPr/>
+        <p:txBody>
+          <a:bodyPr>
+            <a:normAutofit fontScale="90000"/>
+          </a:bodyPr>
+          <a:lstStyle/>
+          <a:p>
+            <a:r>
+              <a:rPr lang="de-CH" dirty="0" smtClean="0"/>
+              <a:t>Grafik</a:t>
+            </a:r>
+            <a:endParaRPr lang="de-CH" dirty="0"/>
+          </a:p>
+        </p:txBody>
+      </p:sp>
+      <p:sp>
+        <p:nvSpPr>
+          <p:cNvPr id="3" name="Inhaltsplatzhalter 2"/>
+          <p:cNvSpPr>
+            <a:spLocks noGrp="1"/>
+          </p:cNvSpPr>
+          <p:nvPr>
+            <p:ph idx="1"/>
+          </p:nvPr>
+        </p:nvSpPr>
+        <p:spPr/>
+        <p:txBody>
+          <a:bodyPr/>
+          <a:lstStyle/>
+          <a:p>
+            <a:r>
+              <a:rPr lang="de-CH" dirty="0" smtClean="0"/>
+              <a:t>Bildinformationen in separaten File</a:t>
+            </a:r>
+          </a:p>
+          <a:p>
+            <a:endParaRPr lang="de-CH" dirty="0" smtClean="0"/>
+          </a:p>
+          <a:p>
+            <a:endParaRPr lang="de-CH" dirty="0"/>
+          </a:p>
+          <a:p>
+            <a:pPr marL="45720" indent="0">
+              <a:buNone/>
+            </a:pPr>
+            <a:endParaRPr lang="de-CH" dirty="0" smtClean="0"/>
+          </a:p>
+          <a:p>
+            <a:r>
+              <a:rPr lang="de-CH" dirty="0" smtClean="0"/>
+              <a:t>Zugriff </a:t>
+            </a:r>
+            <a:r>
+              <a:rPr lang="de-CH" dirty="0"/>
+              <a:t>auf Textur Regionen per Label</a:t>
+            </a:r>
+          </a:p>
+          <a:p>
+            <a:pPr lvl="1"/>
+            <a:r>
+              <a:rPr lang="de-CH" dirty="0"/>
+              <a:t>Bezeichnung unabhängig </a:t>
+            </a:r>
+            <a:r>
+              <a:rPr lang="de-CH" dirty="0" smtClean="0"/>
+              <a:t>vom </a:t>
+            </a:r>
+            <a:r>
+              <a:rPr lang="de-CH" dirty="0"/>
+              <a:t>Datentyp</a:t>
+            </a:r>
+          </a:p>
+          <a:p>
+            <a:endParaRPr lang="de-CH" dirty="0"/>
+          </a:p>
+        </p:txBody>
+      </p:sp>
+      <p:pic>
+        <p:nvPicPr>
+          <p:cNvPr id="5" name="Grafik 4"/>
+          <p:cNvPicPr>
+            <a:picLocks noChangeAspect="1"/>
+          </p:cNvPicPr>
+          <p:nvPr/>
+        </p:nvPicPr>
+        <p:blipFill>
+          <a:blip r:embed="rId2"/>
+          <a:stretch>
+            <a:fillRect/>
+          </a:stretch>
+        </p:blipFill>
+        <p:spPr>
+          <a:xfrm>
+            <a:off x="402419" y="4725144"/>
+            <a:ext cx="8339162" cy="1512168"/>
+          </a:xfrm>
+          <a:prstGeom prst="rect">
+            <a:avLst/>
+          </a:prstGeom>
+          <a:solidFill>
+            <a:srgbClr val="FFFFFF">
+              <a:shade val="85000"/>
+            </a:srgbClr>
+          </a:solidFill>
+          <a:ln w="88900" cap="sq">
+            <a:solidFill>
+              <a:srgbClr val="FFFFFF"/>
+            </a:solidFill>
+            <a:miter lim="800000"/>
+          </a:ln>
+          <a:effectLst>
+            <a:outerShdw blurRad="55000" dist="18000" dir="5400000" algn="tl" rotWithShape="0">
+              <a:srgbClr val="000000">
+                <a:alpha val="40000"/>
+              </a:srgbClr>
+            </a:outerShdw>
+          </a:effectLst>
+          <a:scene3d>
+            <a:camera prst="orthographicFront"/>
+            <a:lightRig rig="twoPt" dir="t">
+              <a:rot lat="0" lon="0" rev="7200000"/>
+            </a:lightRig>
+          </a:scene3d>
+          <a:sp3d>
+            <a:bevelT w="25400" h="19050"/>
+            <a:contourClr>
+              <a:srgbClr val="FFFFFF"/>
+            </a:contourClr>
+          </a:sp3d>
+        </p:spPr>
+      </p:pic>
+      <p:pic>
+        <p:nvPicPr>
+          <p:cNvPr id="7" name="Grafik 6"/>
+          <p:cNvPicPr>
+            <a:picLocks noChangeAspect="1"/>
+          </p:cNvPicPr>
+          <p:nvPr/>
+        </p:nvPicPr>
+        <p:blipFill>
+          <a:blip r:embed="rId3"/>
+          <a:stretch>
+            <a:fillRect/>
+          </a:stretch>
+        </p:blipFill>
+        <p:spPr>
+          <a:xfrm>
+            <a:off x="6607981" y="1434467"/>
+            <a:ext cx="2133600" cy="1981200"/>
+          </a:xfrm>
+          <a:prstGeom prst="rect">
+            <a:avLst/>
+          </a:prstGeom>
+          <a:solidFill>
+            <a:srgbClr val="FFFFFF">
+              <a:shade val="85000"/>
+            </a:srgbClr>
+          </a:solidFill>
+          <a:ln w="88900" cap="sq">
+            <a:solidFill>
+              <a:srgbClr val="FFFFFF"/>
+            </a:solidFill>
+            <a:miter lim="800000"/>
+          </a:ln>
+          <a:effectLst>
+            <a:outerShdw blurRad="55000" dist="18000" dir="5400000" algn="tl" rotWithShape="0">
+              <a:srgbClr val="000000">
+                <a:alpha val="40000"/>
+              </a:srgbClr>
+            </a:outerShdw>
+          </a:effectLst>
+          <a:scene3d>
+            <a:camera prst="orthographicFront"/>
+            <a:lightRig rig="twoPt" dir="t">
+              <a:rot lat="0" lon="0" rev="7200000"/>
+            </a:lightRig>
+          </a:scene3d>
+          <a:sp3d>
+            <a:bevelT w="25400" h="19050"/>
+            <a:contourClr>
+              <a:srgbClr val="FFFFFF"/>
+            </a:contourClr>
+          </a:sp3d>
+        </p:spPr>
+      </p:pic>
+    </p:spTree>
+    <p:extLst>
+      <p:ext uri="{BB962C8B-B14F-4D97-AF65-F5344CB8AC3E}">
+        <p14:creationId xmlns:p14="http://schemas.microsoft.com/office/powerpoint/2010/main" val="1703610407"/>
+      </p:ext>
+    </p:extLst>
+  </p:cSld>
+  <p:clrMapOvr>
+    <a:masterClrMapping/>
+  </p:clrMapOvr>
+  <p:timing>
+    <p:tnLst>
+      <p:par>
+        <p:cTn id="1" dur="indefinite" restart="never" nodeType="tmRoot"/>
+      </p:par>
+    </p:tnLst>
+  </p:timing>
+</p:sld>
+</file>
+
+<file path=ppt/slides/slide19.xml><?xml version="1.0" encoding="utf-8"?>
 <p:sld xmlns:a="http://schemas.openxmlformats.org/drawingml/2006/main" xmlns:r="http://schemas.openxmlformats.org/officeDocument/2006/relationships" xmlns:p="http://schemas.openxmlformats.org/presentationml/2006/main">
   <p:cSld>
     <p:spTree>
@@ -12418,7 +12632,88 @@
 </p:sld>
 </file>
 
-<file path=ppt/slides/slide19.xml><?xml version="1.0" encoding="utf-8"?>
+<file path=ppt/slides/slide2.xml><?xml version="1.0" encoding="utf-8"?>
+<p:sld xmlns:a="http://schemas.openxmlformats.org/drawingml/2006/main" xmlns:r="http://schemas.openxmlformats.org/officeDocument/2006/relationships" xmlns:p="http://schemas.openxmlformats.org/presentationml/2006/main">
+  <p:cSld>
+    <p:spTree>
+      <p:nvGrpSpPr>
+        <p:cNvPr id="1" name=""/>
+        <p:cNvGrpSpPr/>
+        <p:nvPr/>
+      </p:nvGrpSpPr>
+      <p:grpSpPr>
+        <a:xfrm>
+          <a:off x="0" y="0"/>
+          <a:ext cx="0" cy="0"/>
+          <a:chOff x="0" y="0"/>
+          <a:chExt cx="0" cy="0"/>
+        </a:xfrm>
+      </p:grpSpPr>
+      <p:sp>
+        <p:nvSpPr>
+          <p:cNvPr id="2" name="Titel 1"/>
+          <p:cNvSpPr>
+            <a:spLocks noGrp="1"/>
+          </p:cNvSpPr>
+          <p:nvPr>
+            <p:ph type="ctrTitle"/>
+          </p:nvPr>
+        </p:nvSpPr>
+        <p:spPr/>
+        <p:txBody>
+          <a:bodyPr>
+            <a:normAutofit/>
+          </a:bodyPr>
+          <a:lstStyle/>
+          <a:p>
+            <a:r>
+              <a:rPr lang="de-CH" sz="9600" dirty="0" smtClean="0"/>
+              <a:t>Demo</a:t>
+            </a:r>
+            <a:endParaRPr lang="de-CH" sz="9600" dirty="0"/>
+          </a:p>
+        </p:txBody>
+      </p:sp>
+      <p:sp>
+        <p:nvSpPr>
+          <p:cNvPr id="4" name="Untertitel 3"/>
+          <p:cNvSpPr>
+            <a:spLocks noGrp="1"/>
+          </p:cNvSpPr>
+          <p:nvPr>
+            <p:ph type="subTitle" idx="1"/>
+          </p:nvPr>
+        </p:nvSpPr>
+        <p:spPr/>
+        <p:txBody>
+          <a:bodyPr/>
+          <a:lstStyle/>
+          <a:p>
+            <a:endParaRPr lang="de-CH" dirty="0"/>
+          </a:p>
+        </p:txBody>
+      </p:sp>
+    </p:spTree>
+    <p:extLst>
+      <p:ext uri="{BB962C8B-B14F-4D97-AF65-F5344CB8AC3E}">
+        <p14:creationId xmlns:p14="http://schemas.microsoft.com/office/powerpoint/2010/main" val="284351435"/>
+      </p:ext>
+    </p:extLst>
+  </p:cSld>
+  <p:clrMapOvr>
+    <a:masterClrMapping/>
+  </p:clrMapOvr>
+  <p:timing>
+    <p:tnLst>
+      <p:par>
+        <p:cTn id="1" dur="indefinite" restart="never" nodeType="tmRoot"/>
+      </p:par>
+    </p:tnLst>
+  </p:timing>
+</p:sld>
+</file>
+
+<file path=ppt/slides/slide20.xml><?xml version="1.0" encoding="utf-8"?>
 <p:sld xmlns:a="http://schemas.openxmlformats.org/drawingml/2006/main" xmlns:r="http://schemas.openxmlformats.org/officeDocument/2006/relationships" xmlns:p="http://schemas.openxmlformats.org/presentationml/2006/main">
   <p:cSld>
     <p:spTree>
@@ -12691,88 +12986,7 @@
 </p:sld>
 </file>
 
-<file path=ppt/slides/slide2.xml><?xml version="1.0" encoding="utf-8"?>
-<p:sld xmlns:a="http://schemas.openxmlformats.org/drawingml/2006/main" xmlns:r="http://schemas.openxmlformats.org/officeDocument/2006/relationships" xmlns:p="http://schemas.openxmlformats.org/presentationml/2006/main">
-  <p:cSld>
-    <p:spTree>
-      <p:nvGrpSpPr>
-        <p:cNvPr id="1" name=""/>
-        <p:cNvGrpSpPr/>
-        <p:nvPr/>
-      </p:nvGrpSpPr>
-      <p:grpSpPr>
-        <a:xfrm>
-          <a:off x="0" y="0"/>
-          <a:ext cx="0" cy="0"/>
-          <a:chOff x="0" y="0"/>
-          <a:chExt cx="0" cy="0"/>
-        </a:xfrm>
-      </p:grpSpPr>
-      <p:sp>
-        <p:nvSpPr>
-          <p:cNvPr id="2" name="Titel 1"/>
-          <p:cNvSpPr>
-            <a:spLocks noGrp="1"/>
-          </p:cNvSpPr>
-          <p:nvPr>
-            <p:ph type="ctrTitle"/>
-          </p:nvPr>
-        </p:nvSpPr>
-        <p:spPr/>
-        <p:txBody>
-          <a:bodyPr>
-            <a:normAutofit/>
-          </a:bodyPr>
-          <a:lstStyle/>
-          <a:p>
-            <a:r>
-              <a:rPr lang="de-CH" sz="9600" dirty="0" smtClean="0"/>
-              <a:t>Demo</a:t>
-            </a:r>
-            <a:endParaRPr lang="de-CH" sz="9600" dirty="0"/>
-          </a:p>
-        </p:txBody>
-      </p:sp>
-      <p:sp>
-        <p:nvSpPr>
-          <p:cNvPr id="4" name="Untertitel 3"/>
-          <p:cNvSpPr>
-            <a:spLocks noGrp="1"/>
-          </p:cNvSpPr>
-          <p:nvPr>
-            <p:ph type="subTitle" idx="1"/>
-          </p:nvPr>
-        </p:nvSpPr>
-        <p:spPr/>
-        <p:txBody>
-          <a:bodyPr/>
-          <a:lstStyle/>
-          <a:p>
-            <a:endParaRPr lang="de-CH" dirty="0"/>
-          </a:p>
-        </p:txBody>
-      </p:sp>
-    </p:spTree>
-    <p:extLst>
-      <p:ext uri="{BB962C8B-B14F-4D97-AF65-F5344CB8AC3E}">
-        <p14:creationId xmlns:p14="http://schemas.microsoft.com/office/powerpoint/2010/main" val="284351435"/>
-      </p:ext>
-    </p:extLst>
-  </p:cSld>
-  <p:clrMapOvr>
-    <a:masterClrMapping/>
-  </p:clrMapOvr>
-  <p:timing>
-    <p:tnLst>
-      <p:par>
-        <p:cTn id="1" dur="indefinite" restart="never" nodeType="tmRoot"/>
-      </p:par>
-    </p:tnLst>
-  </p:timing>
-</p:sld>
-</file>
-
-<file path=ppt/slides/slide20.xml><?xml version="1.0" encoding="utf-8"?>
+<file path=ppt/slides/slide21.xml><?xml version="1.0" encoding="utf-8"?>
 <p:sld xmlns:a="http://schemas.openxmlformats.org/drawingml/2006/main" xmlns:r="http://schemas.openxmlformats.org/officeDocument/2006/relationships" xmlns:p="http://schemas.openxmlformats.org/presentationml/2006/main">
   <p:cSld>
     <p:spTree>
@@ -12933,7 +13147,7 @@
 </p:sld>
 </file>
 
-<file path=ppt/slides/slide21.xml><?xml version="1.0" encoding="utf-8"?>
+<file path=ppt/slides/slide22.xml><?xml version="1.0" encoding="utf-8"?>
 <p:sld xmlns:a="http://schemas.openxmlformats.org/drawingml/2006/main" xmlns:r="http://schemas.openxmlformats.org/officeDocument/2006/relationships" xmlns:p="http://schemas.openxmlformats.org/presentationml/2006/main">
   <p:cSld>
     <p:spTree>
@@ -12995,7 +13209,7 @@
 </p:sld>
 </file>
 
-<file path=ppt/slides/slide22.xml><?xml version="1.0" encoding="utf-8"?>
+<file path=ppt/slides/slide23.xml><?xml version="1.0" encoding="utf-8"?>
 <p:sld xmlns:a="http://schemas.openxmlformats.org/drawingml/2006/main" xmlns:r="http://schemas.openxmlformats.org/officeDocument/2006/relationships" xmlns:p="http://schemas.openxmlformats.org/presentationml/2006/main">
   <p:cSld>
     <p:spTree>

</xml_diff>

<commit_message>
Kleine Korrektur in der Präsentation.
</commit_message>
<xml_diff>
--- a/Documents/Design/Design_Präsentation_v1.pptx
+++ b/Documents/Design/Design_Präsentation_v1.pptx
@@ -12032,13 +12032,8 @@
             </a:r>
             <a:r>
               <a:rPr lang="de-CH" dirty="0" smtClean="0"/>
-              <a:t> </a:t>
+              <a:t> Dimensionen</a:t>
             </a:r>
-            <a:r>
-              <a:rPr lang="de-CH" dirty="0" smtClean="0"/>
-              <a:t>Dimensionen</a:t>
-            </a:r>
-            <a:endParaRPr lang="de-CH" dirty="0" smtClean="0"/>
           </a:p>
           <a:p>
             <a:pPr lvl="2"/>
@@ -13312,15 +13307,17 @@
             <a:pPr lvl="1"/>
             <a:r>
               <a:rPr lang="de-CH" dirty="0" smtClean="0"/>
-              <a:t>Schiffslänge</a:t>
+              <a:t>Schiffsbreite</a:t>
             </a:r>
+            <a:endParaRPr lang="de-CH" dirty="0" smtClean="0"/>
           </a:p>
           <a:p>
             <a:pPr lvl="1"/>
             <a:r>
               <a:rPr lang="de-CH" dirty="0" smtClean="0"/>
-              <a:t>Schiffsbreite</a:t>
+              <a:t>Schiffshöhe</a:t>
             </a:r>
+            <a:endParaRPr lang="de-CH" dirty="0" smtClean="0"/>
           </a:p>
           <a:p>
             <a:pPr lvl="1"/>

</xml_diff>